<commit_message>
Improved user manuals and demos
</commit_message>
<xml_diff>
--- a/Demo/Syntax Overview16：9.pptx
+++ b/Demo/Syntax Overview16：9.pptx
@@ -198,7 +198,7 @@
           <a:p>
             <a:fld id="{0CE264FF-0559-40C9-B7C9-136E68807C0A}" type="datetimeFigureOut">
               <a:rPr lang="zh-TW" altLang="en-US" smtClean="0"/>
-              <a:t>2017/7/14</a:t>
+              <a:t>2017/7/19</a:t>
             </a:fld>
             <a:endParaRPr lang="zh-TW" altLang="en-US"/>
           </a:p>
@@ -540,227 +540,20 @@
           <a:lstStyle/>
           <a:p>
             <a:r>
-              <a:rPr lang="en-US" altLang="zh-TW" sz="1800" dirty="0" smtClean="0"/>
+              <a:rPr lang="en-US" altLang="zh-TW" sz="2400" dirty="0" smtClean="0"/>
               <a:t>//</a:t>
             </a:r>
             <a:r>
-              <a:rPr lang="zh-TW" altLang="en-US" sz="1800" dirty="0" smtClean="0"/>
+              <a:rPr lang="zh-TW" altLang="en-US" sz="2400" dirty="0" smtClean="0"/>
               <a:t>前面備註隨便要打什麼都可以</a:t>
             </a:r>
             <a:r>
-              <a:rPr lang="en-US" altLang="zh-TW" sz="1800" dirty="0" smtClean="0"/>
+              <a:rPr lang="en-US" altLang="zh-TW" sz="2400" dirty="0" smtClean="0"/>
               <a:t>…</a:t>
             </a:r>
           </a:p>
           <a:p>
-            <a:r>
-              <a:rPr lang="en-US" altLang="zh-TW" sz="1800" dirty="0" smtClean="0">
-                <a:solidFill>
-                  <a:srgbClr val="FF0000"/>
-                </a:solidFill>
-              </a:rPr>
-              <a:t>//</a:t>
-            </a:r>
-            <a:r>
-              <a:rPr lang="zh-TW" altLang="en-US" sz="1800" dirty="0" smtClean="0">
-                <a:solidFill>
-                  <a:srgbClr val="FF0000"/>
-                </a:solidFill>
-              </a:rPr>
-              <a:t>開始</a:t>
-            </a:r>
-            <a:r>
-              <a:rPr lang="en-US" altLang="zh-TW" sz="1800" dirty="0" smtClean="0">
-                <a:solidFill>
-                  <a:srgbClr val="FF0000"/>
-                </a:solidFill>
-              </a:rPr>
-              <a:t>Precision</a:t>
-            </a:r>
-            <a:r>
-              <a:rPr lang="en-US" altLang="zh-TW" sz="1800" baseline="0" dirty="0" smtClean="0">
-                <a:solidFill>
-                  <a:srgbClr val="FF0000"/>
-                </a:solidFill>
-              </a:rPr>
-              <a:t> Lecture</a:t>
-            </a:r>
-            <a:r>
-              <a:rPr lang="zh-TW" altLang="en-US" sz="1800" dirty="0" smtClean="0">
-                <a:solidFill>
-                  <a:srgbClr val="FF0000"/>
-                </a:solidFill>
-              </a:rPr>
-              <a:t>程式碼：</a:t>
-            </a:r>
-            <a:endParaRPr lang="en-US" altLang="zh-TW" sz="1800" dirty="0" smtClean="0">
-              <a:solidFill>
-                <a:srgbClr val="FF0000"/>
-              </a:solidFill>
-            </a:endParaRPr>
-          </a:p>
-          <a:p>
-            <a:r>
-              <a:rPr lang="en-US" altLang="zh-TW" sz="1800" dirty="0" smtClean="0"/>
-              <a:t>&lt;script&gt;</a:t>
-            </a:r>
-          </a:p>
-          <a:p>
-            <a:endParaRPr lang="en-US" altLang="zh-TW" sz="1800" dirty="0" smtClean="0"/>
-          </a:p>
-          <a:p>
-            <a:r>
-              <a:rPr lang="en-US" altLang="zh-TW" sz="1800" dirty="0" smtClean="0"/>
-              <a:t>&lt;!--  </a:t>
-            </a:r>
-            <a:r>
-              <a:rPr lang="zh-TW" altLang="en-US" sz="1800" dirty="0" smtClean="0"/>
-              <a:t>實作</a:t>
-            </a:r>
-            <a:r>
-              <a:rPr lang="en-US" altLang="zh-TW" sz="1800" baseline="0" dirty="0" smtClean="0"/>
-              <a:t> XML-style comment --&gt;</a:t>
-            </a:r>
-          </a:p>
-          <a:p>
-            <a:r>
-              <a:rPr lang="en-US" altLang="zh-TW" sz="1600" baseline="0" dirty="0" smtClean="0"/>
-              <a:t>//</a:t>
-            </a:r>
-            <a:r>
-              <a:rPr lang="zh-TW" altLang="en-US" sz="1600" baseline="0" dirty="0" smtClean="0"/>
-              <a:t>      </a:t>
-            </a:r>
-            <a:r>
-              <a:rPr lang="zh-TW" altLang="en-US" sz="1600" dirty="0" smtClean="0"/>
-              <a:t>實作</a:t>
-            </a:r>
-            <a:r>
-              <a:rPr lang="en-US" altLang="zh-TW" sz="1600" baseline="0" dirty="0" smtClean="0"/>
-              <a:t> C-style single line comment</a:t>
-            </a:r>
-          </a:p>
-          <a:p>
-            <a:r>
-              <a:rPr lang="en-US" altLang="zh-TW" sz="1600" baseline="0" dirty="0" smtClean="0"/>
-              <a:t>/*      </a:t>
-            </a:r>
-            <a:r>
-              <a:rPr lang="zh-TW" altLang="en-US" sz="1600" dirty="0" smtClean="0"/>
-              <a:t>實作</a:t>
-            </a:r>
-            <a:r>
-              <a:rPr lang="en-US" altLang="zh-TW" sz="1600" baseline="0" dirty="0" smtClean="0"/>
-              <a:t> C-style multi-line comment    */</a:t>
-            </a:r>
-          </a:p>
-          <a:p>
-            <a:endParaRPr lang="en-US" altLang="zh-TW" sz="1600" dirty="0" smtClean="0"/>
-          </a:p>
-          <a:p>
-            <a:r>
-              <a:rPr lang="en-US" altLang="zh-TW" sz="1600" dirty="0" smtClean="0"/>
-              <a:t>Speed 12</a:t>
-            </a:r>
-            <a:r>
-              <a:rPr lang="zh-TW" altLang="en-US" sz="1600" dirty="0" smtClean="0"/>
-              <a:t>   </a:t>
-            </a:r>
-            <a:r>
-              <a:rPr lang="en-US" altLang="zh-TW" sz="1600" dirty="0" smtClean="0"/>
-              <a:t>//</a:t>
-            </a:r>
-            <a:r>
-              <a:rPr lang="zh-TW" altLang="en-US" sz="1600" dirty="0" smtClean="0"/>
-              <a:t>每分鐘幾張投影片；沒有加這一行，就照預設值</a:t>
-            </a:r>
-            <a:endParaRPr lang="en-US" altLang="zh-TW" sz="1600" dirty="0" smtClean="0"/>
-          </a:p>
-          <a:p>
-            <a:endParaRPr lang="en-US" altLang="zh-TW" sz="1600" dirty="0" smtClean="0"/>
-          </a:p>
-          <a:p>
-            <a:r>
-              <a:rPr lang="en-US" altLang="zh-TW" sz="1600" dirty="0" smtClean="0"/>
-              <a:t>//</a:t>
-            </a:r>
-            <a:r>
-              <a:rPr lang="zh-TW" altLang="en-US" sz="1600" dirty="0" smtClean="0"/>
-              <a:t>參數若包含空格，可以用三個連續雙引號包起來 （</a:t>
-            </a:r>
-            <a:r>
-              <a:rPr lang="en-US" altLang="zh-TW" sz="1600" dirty="0" smtClean="0"/>
-              <a:t>””” … “””</a:t>
-            </a:r>
-            <a:r>
-              <a:rPr lang="zh-TW" altLang="en-US" sz="1600" dirty="0" smtClean="0"/>
-              <a:t>）</a:t>
-            </a:r>
-            <a:endParaRPr lang="en-US" altLang="zh-TW" sz="1600" dirty="0" smtClean="0"/>
-          </a:p>
-          <a:p>
-            <a:r>
-              <a:rPr lang="en-US" altLang="zh-TW" sz="1600" dirty="0" smtClean="0"/>
-              <a:t>//Say</a:t>
-            </a:r>
-            <a:r>
-              <a:rPr lang="zh-TW" altLang="en-US" sz="1600" dirty="0" smtClean="0"/>
-              <a:t>指令：使用</a:t>
-            </a:r>
-            <a:r>
-              <a:rPr lang="en-US" altLang="zh-TW" sz="1600" dirty="0" smtClean="0"/>
-              <a:t>SSML</a:t>
-            </a:r>
-            <a:r>
-              <a:rPr lang="zh-TW" altLang="en-US" sz="1600" dirty="0" smtClean="0"/>
-              <a:t>語法來合成口白語音，可以正常說出希臘符號及多國語言，也可以自行加新詞</a:t>
-            </a:r>
-            <a:endParaRPr lang="en-US" altLang="zh-TW" sz="1600" dirty="0" smtClean="0"/>
-          </a:p>
-          <a:p>
-            <a:r>
-              <a:rPr lang="en-US" altLang="zh-TW" sz="1600" dirty="0" smtClean="0"/>
-              <a:t>//                   SSML</a:t>
-            </a:r>
-            <a:r>
-              <a:rPr lang="zh-TW" altLang="en-US" sz="1600" dirty="0" smtClean="0"/>
-              <a:t>語法請參考： </a:t>
-            </a:r>
-            <a:r>
-              <a:rPr lang="en-US" altLang="zh-TW" sz="1600" dirty="0" smtClean="0"/>
-              <a:t>1.   https://docs.microsoft.com/en-us/cortana/reference/ssml </a:t>
-            </a:r>
-          </a:p>
-          <a:p>
-            <a:r>
-              <a:rPr lang="en-US" altLang="zh-TW" sz="1600" dirty="0" smtClean="0"/>
-              <a:t>//                                                      2.   https://www.w3.org/TR/speech-synthesis/</a:t>
-            </a:r>
-          </a:p>
-          <a:p>
-            <a:endParaRPr lang="en-US" altLang="zh-TW" sz="1600" dirty="0" smtClean="0"/>
-          </a:p>
-          <a:p>
-            <a:r>
-              <a:rPr lang="en-US" altLang="zh-TW" sz="1600" dirty="0" smtClean="0"/>
-              <a:t>Say “””&lt;voice </a:t>
-            </a:r>
-            <a:r>
-              <a:rPr lang="en-US" altLang="zh-TW" sz="1600" dirty="0" err="1" smtClean="0"/>
-              <a:t>xml:lang</a:t>
-            </a:r>
-            <a:r>
-              <a:rPr lang="en-US" altLang="zh-TW" sz="1600" dirty="0" smtClean="0"/>
-              <a:t>="</a:t>
-            </a:r>
-            <a:r>
-              <a:rPr lang="en-US" altLang="zh-TW" sz="1600" dirty="0" err="1" smtClean="0"/>
-              <a:t>en</a:t>
-            </a:r>
-            <a:r>
-              <a:rPr lang="en-US" altLang="zh-TW" sz="1600" dirty="0" smtClean="0"/>
-              <a:t>-US“   gender=”female“&gt;In the past 30 years rapid development of ultrafast laser has led to many important applications in science. &lt;/voice&gt;”””</a:t>
-            </a:r>
+            <a:endParaRPr lang="en-US" altLang="zh-TW" sz="2400" dirty="0" smtClean="0"/>
           </a:p>
           <a:p>
             <a:pPr marL="0" marR="0" lvl="0" indent="0" algn="l" defTabSz="914400" rtl="0" eaLnBrk="1" fontAlgn="auto" latinLnBrk="0" hangingPunct="1">
@@ -781,33 +574,131 @@
               <a:defRPr/>
             </a:pPr>
             <a:r>
-              <a:rPr lang="en-US" altLang="zh-TW" sz="1600" dirty="0" smtClean="0"/>
-              <a:t>Say “””&lt;voice </a:t>
-            </a:r>
-            <a:r>
-              <a:rPr lang="en-US" altLang="zh-TW" sz="1600" dirty="0" err="1" smtClean="0"/>
-              <a:t>xml:lang</a:t>
-            </a:r>
-            <a:r>
-              <a:rPr lang="en-US" altLang="zh-TW" sz="1600" dirty="0" smtClean="0"/>
-              <a:t>=“</a:t>
-            </a:r>
-            <a:r>
-              <a:rPr lang="en-US" altLang="zh-TW" sz="1600" dirty="0" err="1" smtClean="0"/>
-              <a:t>zh</a:t>
-            </a:r>
-            <a:r>
-              <a:rPr lang="en-US" altLang="zh-TW" sz="1600" dirty="0" smtClean="0"/>
-              <a:t>-TW“   gender=”female“&gt;</a:t>
-            </a:r>
-            <a:r>
-              <a:rPr lang="zh-TW" altLang="en-US" sz="1600" dirty="0" smtClean="0"/>
-              <a:t>我是大衛</a:t>
-            </a:r>
-            <a:r>
-              <a:rPr lang="en-US" altLang="zh-TW" sz="1600" dirty="0" smtClean="0"/>
-              <a:t>&lt;/voice&gt;”””</a:t>
-            </a:r>
+              <a:rPr lang="en-US" altLang="zh-TW" sz="2400" dirty="0" smtClean="0"/>
+              <a:t>//</a:t>
+            </a:r>
+            <a:r>
+              <a:rPr lang="zh-TW" altLang="en-US" sz="2400" dirty="0" smtClean="0"/>
+              <a:t>用</a:t>
+            </a:r>
+            <a:r>
+              <a:rPr lang="en-US" altLang="zh-TW" sz="2400" dirty="0" smtClean="0"/>
+              <a:t>&lt;script&gt;…&lt;/script&gt;</a:t>
+            </a:r>
+            <a:r>
+              <a:rPr lang="zh-TW" altLang="en-US" sz="2400" dirty="0" smtClean="0"/>
+              <a:t>包起</a:t>
+            </a:r>
+            <a:r>
+              <a:rPr lang="en-US" altLang="zh-TW" sz="2400" dirty="0" smtClean="0">
+                <a:solidFill>
+                  <a:srgbClr val="FF0000"/>
+                </a:solidFill>
+              </a:rPr>
+              <a:t>Perfect Lecture</a:t>
+            </a:r>
+            <a:r>
+              <a:rPr lang="zh-TW" altLang="en-US" sz="2400" dirty="0" smtClean="0">
+                <a:solidFill>
+                  <a:srgbClr val="FF0000"/>
+                </a:solidFill>
+              </a:rPr>
+              <a:t>程式碼：</a:t>
+            </a:r>
+            <a:endParaRPr lang="en-US" altLang="zh-TW" sz="2400" dirty="0" smtClean="0"/>
+          </a:p>
+          <a:p>
+            <a:r>
+              <a:rPr lang="en-US" altLang="zh-TW" sz="2400" dirty="0" smtClean="0"/>
+              <a:t>//</a:t>
+            </a:r>
+            <a:r>
+              <a:rPr lang="zh-TW" altLang="en-US" sz="2400" dirty="0" smtClean="0">
+                <a:solidFill>
+                  <a:srgbClr val="FF0000"/>
+                </a:solidFill>
+              </a:rPr>
+              <a:t>開始</a:t>
+            </a:r>
+            <a:r>
+              <a:rPr lang="en-US" altLang="zh-TW" sz="2400" dirty="0" smtClean="0">
+                <a:solidFill>
+                  <a:srgbClr val="FF0000"/>
+                </a:solidFill>
+              </a:rPr>
+              <a:t>Perfect Lecture</a:t>
+            </a:r>
+            <a:r>
+              <a:rPr lang="zh-TW" altLang="en-US" sz="2400" dirty="0" smtClean="0">
+                <a:solidFill>
+                  <a:srgbClr val="FF0000"/>
+                </a:solidFill>
+              </a:rPr>
+              <a:t>程式碼：</a:t>
+            </a:r>
+            <a:endParaRPr lang="en-US" altLang="zh-TW" sz="2400" dirty="0" smtClean="0">
+              <a:solidFill>
+                <a:srgbClr val="FF0000"/>
+              </a:solidFill>
+            </a:endParaRPr>
+          </a:p>
+          <a:p>
+            <a:r>
+              <a:rPr lang="en-US" altLang="zh-TW" sz="2400" dirty="0" smtClean="0"/>
+              <a:t>&lt;script&gt;</a:t>
+            </a:r>
+          </a:p>
+          <a:p>
+            <a:endParaRPr lang="en-US" altLang="zh-TW" sz="2400" dirty="0" smtClean="0"/>
+          </a:p>
+          <a:p>
+            <a:r>
+              <a:rPr lang="en-US" altLang="zh-TW" sz="2400" dirty="0" smtClean="0"/>
+              <a:t>&lt;!--  </a:t>
+            </a:r>
+            <a:r>
+              <a:rPr lang="zh-TW" altLang="en-US" sz="2400" dirty="0" smtClean="0"/>
+              <a:t>實作</a:t>
+            </a:r>
+            <a:r>
+              <a:rPr lang="en-US" altLang="zh-TW" sz="2400" baseline="0" dirty="0" smtClean="0"/>
+              <a:t> XML-style comment --&gt;</a:t>
+            </a:r>
+          </a:p>
+          <a:p>
+            <a:r>
+              <a:rPr lang="en-US" altLang="zh-TW" sz="2400" baseline="0" dirty="0" smtClean="0"/>
+              <a:t>//</a:t>
+            </a:r>
+            <a:r>
+              <a:rPr lang="zh-TW" altLang="en-US" sz="2400" baseline="0" dirty="0" smtClean="0"/>
+              <a:t>      </a:t>
+            </a:r>
+            <a:r>
+              <a:rPr lang="zh-TW" altLang="en-US" sz="2400" dirty="0" smtClean="0"/>
+              <a:t>實作</a:t>
+            </a:r>
+            <a:r>
+              <a:rPr lang="en-US" altLang="zh-TW" sz="2400" baseline="0" dirty="0" smtClean="0"/>
+              <a:t> C-style single line comment</a:t>
+            </a:r>
+          </a:p>
+          <a:p>
+            <a:r>
+              <a:rPr lang="en-US" altLang="zh-TW" sz="2400" baseline="0" dirty="0" smtClean="0"/>
+              <a:t>/*      </a:t>
+            </a:r>
+            <a:r>
+              <a:rPr lang="zh-TW" altLang="en-US" sz="2400" dirty="0" smtClean="0"/>
+              <a:t>實作</a:t>
+            </a:r>
+            <a:r>
+              <a:rPr lang="en-US" altLang="zh-TW" sz="2400" baseline="0" dirty="0" smtClean="0"/>
+              <a:t> C-style multi-line comment    */</a:t>
+            </a:r>
+          </a:p>
+          <a:p>
+            <a:endParaRPr lang="en-US" altLang="zh-TW" sz="2400" baseline="0" dirty="0" smtClean="0"/>
           </a:p>
           <a:p>
             <a:pPr marL="0" marR="0" lvl="0" indent="0" algn="l" defTabSz="914400" rtl="0" eaLnBrk="1" fontAlgn="auto" latinLnBrk="0" hangingPunct="1">
@@ -827,7 +718,23 @@
               <a:tabLst/>
               <a:defRPr/>
             </a:pPr>
-            <a:endParaRPr lang="en-US" altLang="zh-TW" sz="1600" dirty="0" smtClean="0"/>
+            <a:r>
+              <a:rPr lang="en-US" altLang="zh-TW" sz="2400" dirty="0" smtClean="0"/>
+              <a:t>//</a:t>
+            </a:r>
+            <a:r>
+              <a:rPr lang="zh-TW" altLang="en-US" sz="2400" dirty="0" smtClean="0"/>
+              <a:t>指令參數可以用三個連續雙引號包起來 （</a:t>
+            </a:r>
+            <a:r>
+              <a:rPr lang="en-US" altLang="zh-TW" sz="2400" dirty="0" smtClean="0"/>
+              <a:t>””” … “””</a:t>
+            </a:r>
+            <a:r>
+              <a:rPr lang="zh-TW" altLang="en-US" sz="2400" dirty="0" smtClean="0"/>
+              <a:t>）</a:t>
+            </a:r>
+            <a:endParaRPr lang="en-US" altLang="zh-TW" sz="2400" dirty="0" smtClean="0"/>
           </a:p>
           <a:p>
             <a:pPr marL="0" marR="0" lvl="0" indent="0" algn="l" defTabSz="914400" rtl="0" eaLnBrk="1" fontAlgn="auto" latinLnBrk="0" hangingPunct="1">
@@ -848,41 +755,22 @@
               <a:defRPr/>
             </a:pPr>
             <a:r>
-              <a:rPr lang="en-US" altLang="zh-TW" sz="1600" dirty="0" smtClean="0"/>
-              <a:t>Say “””&lt;voice </a:t>
-            </a:r>
-            <a:r>
-              <a:rPr lang="en-US" altLang="zh-TW" sz="1600" dirty="0" err="1" smtClean="0"/>
-              <a:t>xml:lang</a:t>
-            </a:r>
-            <a:r>
-              <a:rPr lang="en-US" altLang="zh-TW" sz="1600" dirty="0" smtClean="0"/>
-              <a:t>="</a:t>
-            </a:r>
-            <a:r>
-              <a:rPr lang="en-US" altLang="zh-TW" sz="1600" dirty="0" err="1" smtClean="0"/>
-              <a:t>en</a:t>
-            </a:r>
-            <a:r>
-              <a:rPr lang="en-US" altLang="zh-TW" sz="1600" dirty="0" smtClean="0"/>
-              <a:t>-US"&gt;</a:t>
-            </a:r>
-            <a:r>
-              <a:rPr lang="en-US" altLang="zh-TW" sz="1600" b="0" kern="1200" dirty="0" smtClean="0">
-                <a:solidFill>
-                  <a:schemeClr val="tx1"/>
-                </a:solidFill>
-                <a:effectLst/>
-                <a:latin typeface="+mn-lt"/>
-                <a:ea typeface="+mn-ea"/>
-                <a:cs typeface="+mn-cs"/>
-              </a:rPr>
-              <a:t>I can speak α</a:t>
-            </a:r>
-            <a:r>
-              <a:rPr lang="en-US" altLang="zh-TW" sz="1600" dirty="0" smtClean="0"/>
-              <a:t>&lt;/voice&gt;”””</a:t>
-            </a:r>
+              <a:rPr lang="en-US" altLang="zh-TW" sz="2400" dirty="0" smtClean="0"/>
+              <a:t>//</a:t>
+            </a:r>
+            <a:r>
+              <a:rPr lang="zh-TW" altLang="en-US" sz="2400" dirty="0" smtClean="0"/>
+              <a:t>例如：參數包含空格時，可以用</a:t>
+            </a:r>
+            <a:r>
+              <a:rPr lang="en-US" altLang="zh-TW" sz="2400" dirty="0" smtClean="0"/>
+              <a:t>”””…”””</a:t>
+            </a:r>
+            <a:r>
+              <a:rPr lang="zh-TW" altLang="en-US" sz="2400" dirty="0" smtClean="0"/>
+              <a:t>包起來，避免此空格被視為參數之間的分隔</a:t>
+            </a:r>
+            <a:endParaRPr lang="en-US" altLang="zh-TW" sz="2400" dirty="0" smtClean="0"/>
           </a:p>
           <a:p>
             <a:pPr marL="0" marR="0" lvl="0" indent="0" algn="l" defTabSz="914400" rtl="0" eaLnBrk="1" fontAlgn="auto" latinLnBrk="0" hangingPunct="1">
@@ -902,42 +790,7 @@
               <a:tabLst/>
               <a:defRPr/>
             </a:pPr>
-            <a:r>
-              <a:rPr lang="en-US" altLang="zh-TW" sz="1600" dirty="0" smtClean="0"/>
-              <a:t>Say “””&lt;voice </a:t>
-            </a:r>
-            <a:r>
-              <a:rPr lang="en-US" altLang="zh-TW" sz="1600" dirty="0" err="1" smtClean="0"/>
-              <a:t>xml:lang</a:t>
-            </a:r>
-            <a:r>
-              <a:rPr lang="en-US" altLang="zh-TW" sz="1600" dirty="0" smtClean="0"/>
-              <a:t>="</a:t>
-            </a:r>
-            <a:r>
-              <a:rPr lang="en-US" altLang="zh-TW" sz="1600" dirty="0" err="1" smtClean="0"/>
-              <a:t>en</a:t>
-            </a:r>
-            <a:r>
-              <a:rPr lang="en-US" altLang="zh-TW" sz="1600" dirty="0" smtClean="0"/>
-              <a:t>-US"&gt;</a:t>
-            </a:r>
-            <a:r>
-              <a:rPr lang="en-US" altLang="zh-TW" sz="1600" b="0" kern="1200" dirty="0" smtClean="0">
-                <a:solidFill>
-                  <a:schemeClr val="tx1"/>
-                </a:solidFill>
-                <a:effectLst/>
-                <a:latin typeface="+mn-lt"/>
-                <a:ea typeface="+mn-ea"/>
-                <a:cs typeface="+mn-cs"/>
-              </a:rPr>
-              <a:t>I can speak alpha</a:t>
-            </a:r>
-            <a:r>
-              <a:rPr lang="en-US" altLang="zh-TW" sz="1600" dirty="0" smtClean="0"/>
-              <a:t>&lt;/voice&gt;”””</a:t>
-            </a:r>
+            <a:endParaRPr lang="en-US" altLang="zh-TW" sz="2400" baseline="0" dirty="0" smtClean="0"/>
           </a:p>
           <a:p>
             <a:pPr marL="0" marR="0" lvl="0" indent="0" algn="l" defTabSz="914400" rtl="0" eaLnBrk="1" fontAlgn="auto" latinLnBrk="0" hangingPunct="1">
@@ -957,7 +810,15 @@
               <a:tabLst/>
               <a:defRPr/>
             </a:pPr>
-            <a:endParaRPr lang="en-US" altLang="zh-TW" sz="1600" dirty="0" smtClean="0"/>
+            <a:r>
+              <a:rPr lang="en-US" altLang="zh-TW" sz="2400" dirty="0" smtClean="0"/>
+              <a:t>//Speed</a:t>
+            </a:r>
+            <a:r>
+              <a:rPr lang="zh-TW" altLang="en-US" sz="2400" dirty="0" smtClean="0"/>
+              <a:t>指令：</a:t>
+            </a:r>
+            <a:endParaRPr lang="en-US" altLang="zh-TW" sz="2400" dirty="0" smtClean="0"/>
           </a:p>
           <a:p>
             <a:pPr marL="0" marR="0" lvl="0" indent="0" algn="l" defTabSz="914400" rtl="0" eaLnBrk="1" fontAlgn="auto" latinLnBrk="0" hangingPunct="1">
@@ -978,53 +839,14 @@
               <a:defRPr/>
             </a:pPr>
             <a:r>
-              <a:rPr lang="en-US" altLang="zh-TW" sz="1600" dirty="0" smtClean="0"/>
-              <a:t>Say “””&lt;voice </a:t>
-            </a:r>
-            <a:r>
-              <a:rPr lang="en-US" altLang="zh-TW" sz="1600" dirty="0" err="1" smtClean="0"/>
-              <a:t>xml:lang</a:t>
-            </a:r>
-            <a:r>
-              <a:rPr lang="en-US" altLang="zh-TW" sz="1600" dirty="0" smtClean="0"/>
-              <a:t>="</a:t>
-            </a:r>
-            <a:r>
-              <a:rPr lang="en-US" altLang="zh-TW" sz="1600" dirty="0" err="1" smtClean="0"/>
-              <a:t>en</a:t>
-            </a:r>
-            <a:r>
-              <a:rPr lang="en-US" altLang="zh-TW" sz="1600" dirty="0" smtClean="0"/>
-              <a:t>-US"&gt;</a:t>
-            </a:r>
-            <a:r>
-              <a:rPr lang="en-US" altLang="zh-TW" sz="1600" b="0" kern="1200" dirty="0" smtClean="0">
-                <a:solidFill>
-                  <a:schemeClr val="tx1"/>
-                </a:solidFill>
-                <a:effectLst/>
-                <a:latin typeface="+mn-lt"/>
-                <a:ea typeface="+mn-ea"/>
-                <a:cs typeface="+mn-cs"/>
-              </a:rPr>
-              <a:t>I can speak </a:t>
-            </a:r>
-            <a:r>
-              <a:rPr lang="el-GR" altLang="zh-TW" sz="1600" b="0" kern="1200" dirty="0" smtClean="0">
-                <a:solidFill>
-                  <a:schemeClr val="tx1"/>
-                </a:solidFill>
-                <a:effectLst/>
-                <a:latin typeface="+mn-lt"/>
-                <a:ea typeface="+mn-ea"/>
-                <a:cs typeface="+mn-cs"/>
-              </a:rPr>
-              <a:t>π</a:t>
-            </a:r>
-            <a:r>
-              <a:rPr lang="en-US" altLang="zh-TW" sz="1600" dirty="0" smtClean="0"/>
-              <a:t>&lt;/voice&gt;”””</a:t>
-            </a:r>
+              <a:rPr lang="en-US" altLang="zh-TW" sz="2400" dirty="0" smtClean="0"/>
+              <a:t>//</a:t>
+            </a:r>
+            <a:r>
+              <a:rPr lang="zh-TW" altLang="en-US" sz="2400" dirty="0" smtClean="0"/>
+              <a:t>用法：</a:t>
+            </a:r>
+            <a:endParaRPr lang="en-US" altLang="zh-TW" sz="2400" dirty="0" smtClean="0"/>
           </a:p>
           <a:p>
             <a:pPr marL="0" marR="0" lvl="0" indent="0" algn="l" defTabSz="914400" rtl="0" eaLnBrk="1" fontAlgn="auto" latinLnBrk="0" hangingPunct="1">
@@ -1045,40 +867,36 @@
               <a:defRPr/>
             </a:pPr>
             <a:r>
-              <a:rPr lang="en-US" altLang="zh-TW" sz="1600" dirty="0" smtClean="0"/>
-              <a:t>Say “””&lt;voice </a:t>
-            </a:r>
-            <a:r>
-              <a:rPr lang="en-US" altLang="zh-TW" sz="1600" dirty="0" err="1" smtClean="0"/>
-              <a:t>xml:lang</a:t>
-            </a:r>
-            <a:r>
-              <a:rPr lang="en-US" altLang="zh-TW" sz="1600" dirty="0" smtClean="0"/>
-              <a:t>="</a:t>
-            </a:r>
-            <a:r>
-              <a:rPr lang="en-US" altLang="zh-TW" sz="1600" dirty="0" err="1" smtClean="0"/>
-              <a:t>en</a:t>
-            </a:r>
-            <a:r>
-              <a:rPr lang="en-US" altLang="zh-TW" sz="1600" dirty="0" smtClean="0"/>
-              <a:t>-US"&gt;</a:t>
-            </a:r>
-            <a:r>
-              <a:rPr lang="en-US" altLang="zh-TW" sz="1600" b="0" kern="1200" dirty="0" smtClean="0">
-                <a:solidFill>
-                  <a:schemeClr val="tx1"/>
-                </a:solidFill>
-                <a:effectLst/>
-                <a:latin typeface="+mn-lt"/>
-                <a:ea typeface="+mn-ea"/>
-                <a:cs typeface="+mn-cs"/>
-              </a:rPr>
-              <a:t>I can speak Pi</a:t>
-            </a:r>
-            <a:r>
-              <a:rPr lang="en-US" altLang="zh-TW" sz="1600" dirty="0" smtClean="0"/>
-              <a:t>&lt;/voice&gt;”””</a:t>
+              <a:rPr lang="en-US" altLang="zh-TW" sz="2400" dirty="0" smtClean="0"/>
+              <a:t>//</a:t>
+            </a:r>
+            <a:r>
+              <a:rPr lang="en-US" altLang="zh-TW" sz="2400" baseline="0" dirty="0" smtClean="0"/>
+              <a:t>         </a:t>
+            </a:r>
+            <a:r>
+              <a:rPr lang="en-US" altLang="zh-TW" sz="2400" dirty="0" smtClean="0"/>
+              <a:t>Speed</a:t>
+            </a:r>
+            <a:r>
+              <a:rPr lang="en-US" altLang="zh-TW" sz="2400" baseline="0" dirty="0" smtClean="0"/>
+              <a:t> </a:t>
+            </a:r>
+            <a:r>
+              <a:rPr lang="en-US" altLang="zh-TW" sz="2400" b="1" i="1" baseline="0" dirty="0" smtClean="0"/>
+              <a:t>&lt;</a:t>
+            </a:r>
+            <a:r>
+              <a:rPr lang="zh-TW" altLang="en-US" sz="2400" b="1" i="1" u="sng" baseline="0" dirty="0" smtClean="0"/>
+              <a:t>下一行開始</a:t>
+            </a:r>
+            <a:r>
+              <a:rPr lang="zh-TW" altLang="en-US" sz="2400" b="1" i="1" u="sng" dirty="0" smtClean="0"/>
+              <a:t>每分鐘播幾張投影片</a:t>
+            </a:r>
+            <a:r>
+              <a:rPr lang="en-US" altLang="zh-TW" sz="2400" b="1" i="1" dirty="0" smtClean="0"/>
+              <a:t>&gt;</a:t>
             </a:r>
           </a:p>
           <a:p>
@@ -1099,7 +917,103 @@
               <a:tabLst/>
               <a:defRPr/>
             </a:pPr>
-            <a:endParaRPr lang="en-US" altLang="zh-TW" sz="1600" dirty="0" smtClean="0"/>
+            <a:r>
+              <a:rPr lang="en-US" altLang="zh-TW" sz="2400" dirty="0" smtClean="0"/>
+              <a:t>//</a:t>
+            </a:r>
+            <a:r>
+              <a:rPr lang="zh-TW" altLang="en-US" sz="2400" dirty="0" smtClean="0"/>
+              <a:t>沒有加這一行，就照 </a:t>
+            </a:r>
+            <a:r>
+              <a:rPr lang="zh-TW" altLang="en-US" sz="2400" b="1" i="1" u="none" dirty="0" smtClean="0"/>
+              <a:t>上次</a:t>
+            </a:r>
+            <a:r>
+              <a:rPr lang="en-US" altLang="zh-TW" sz="2400" b="1" i="1" u="none" dirty="0" smtClean="0"/>
+              <a:t>Speed</a:t>
+            </a:r>
+            <a:r>
+              <a:rPr lang="zh-TW" altLang="en-US" sz="2400" b="1" i="1" u="none" dirty="0" smtClean="0"/>
+              <a:t>指令設定 </a:t>
+            </a:r>
+            <a:r>
+              <a:rPr lang="zh-TW" altLang="en-US" sz="2400" dirty="0" smtClean="0"/>
+              <a:t>或 </a:t>
+            </a:r>
+            <a:r>
+              <a:rPr lang="zh-TW" altLang="en-US" sz="2400" b="1" i="1" dirty="0" smtClean="0"/>
+              <a:t>預設值</a:t>
+            </a:r>
+            <a:r>
+              <a:rPr lang="zh-TW" altLang="en-US" sz="2400" b="1" dirty="0" smtClean="0"/>
+              <a:t>（每張</a:t>
+            </a:r>
+            <a:r>
+              <a:rPr lang="en-US" altLang="zh-TW" sz="2400" b="1" dirty="0" smtClean="0"/>
+              <a:t>5</a:t>
+            </a:r>
+            <a:r>
+              <a:rPr lang="zh-TW" altLang="en-US" sz="2400" b="1" dirty="0" smtClean="0"/>
+              <a:t>秒鐘，每分鐘</a:t>
+            </a:r>
+            <a:r>
+              <a:rPr lang="en-US" altLang="zh-TW" sz="2400" b="1" dirty="0" smtClean="0"/>
+              <a:t>12</a:t>
+            </a:r>
+            <a:r>
+              <a:rPr lang="zh-TW" altLang="en-US" sz="2400" b="1" dirty="0" smtClean="0"/>
+              <a:t>張）</a:t>
+            </a:r>
+            <a:endParaRPr lang="en-US" altLang="zh-TW" sz="2400" b="1" dirty="0" smtClean="0"/>
+          </a:p>
+          <a:p>
+            <a:r>
+              <a:rPr lang="en-US" altLang="zh-TW" sz="2400" dirty="0" smtClean="0"/>
+              <a:t>Speed 12</a:t>
+            </a:r>
+          </a:p>
+          <a:p>
+            <a:endParaRPr lang="en-US" altLang="zh-TW" sz="2400" dirty="0" smtClean="0"/>
+          </a:p>
+          <a:p>
+            <a:r>
+              <a:rPr lang="en-US" altLang="zh-TW" sz="2400" dirty="0" smtClean="0"/>
+              <a:t>//Say</a:t>
+            </a:r>
+            <a:r>
+              <a:rPr lang="zh-TW" altLang="en-US" sz="2400" dirty="0" smtClean="0"/>
+              <a:t>指令：使用</a:t>
+            </a:r>
+            <a:r>
+              <a:rPr lang="en-US" altLang="zh-TW" sz="2400" dirty="0" smtClean="0"/>
+              <a:t>SSML</a:t>
+            </a:r>
+            <a:r>
+              <a:rPr lang="zh-TW" altLang="en-US" sz="2400" dirty="0" smtClean="0"/>
+              <a:t>語法來合成口白語音，可以正常說出希臘符號及多國語言，也可以自行加新詞</a:t>
+            </a:r>
+            <a:endParaRPr lang="en-US" altLang="zh-TW" sz="2400" dirty="0" smtClean="0"/>
+          </a:p>
+          <a:p>
+            <a:r>
+              <a:rPr lang="en-US" altLang="zh-TW" sz="2400" dirty="0" smtClean="0"/>
+              <a:t>//                   SSML</a:t>
+            </a:r>
+            <a:r>
+              <a:rPr lang="zh-TW" altLang="en-US" sz="2400" dirty="0" smtClean="0"/>
+              <a:t>語法請參考： </a:t>
+            </a:r>
+            <a:r>
+              <a:rPr lang="en-US" altLang="zh-TW" sz="2400" dirty="0" smtClean="0"/>
+              <a:t>1.   https://docs.microsoft.com/en-us/cortana/reference/ssml </a:t>
+            </a:r>
+          </a:p>
+          <a:p>
+            <a:r>
+              <a:rPr lang="en-US" altLang="zh-TW" sz="2400" dirty="0" smtClean="0"/>
+              <a:t>//                                                      2.   https://www.w3.org/TR/speech-synthesis/</a:t>
+            </a:r>
           </a:p>
           <a:p>
             <a:pPr marL="0" marR="0" lvl="0" indent="0" algn="l" defTabSz="914400" rtl="0" eaLnBrk="1" fontAlgn="auto" latinLnBrk="0" hangingPunct="1">
@@ -1120,53 +1034,14 @@
               <a:defRPr/>
             </a:pPr>
             <a:r>
-              <a:rPr lang="en-US" altLang="zh-TW" sz="1600" dirty="0" smtClean="0"/>
-              <a:t>Say “””&lt;voice </a:t>
-            </a:r>
-            <a:r>
-              <a:rPr lang="en-US" altLang="zh-TW" sz="1600" dirty="0" err="1" smtClean="0"/>
-              <a:t>xml:lang</a:t>
-            </a:r>
-            <a:r>
-              <a:rPr lang="en-US" altLang="zh-TW" sz="1600" dirty="0" smtClean="0"/>
-              <a:t>="</a:t>
-            </a:r>
-            <a:r>
-              <a:rPr lang="en-US" altLang="zh-TW" sz="1600" dirty="0" err="1" smtClean="0"/>
-              <a:t>en</a:t>
-            </a:r>
-            <a:r>
-              <a:rPr lang="en-US" altLang="zh-TW" sz="1600" dirty="0" smtClean="0"/>
-              <a:t>-US"&gt;</a:t>
-            </a:r>
-            <a:r>
-              <a:rPr lang="en-US" altLang="zh-TW" sz="1600" b="0" kern="1200" dirty="0" smtClean="0">
-                <a:solidFill>
-                  <a:schemeClr val="tx1"/>
-                </a:solidFill>
-                <a:effectLst/>
-                <a:latin typeface="+mn-lt"/>
-                <a:ea typeface="+mn-ea"/>
-                <a:cs typeface="+mn-cs"/>
-              </a:rPr>
-              <a:t>I can speak </a:t>
-            </a:r>
-            <a:r>
-              <a:rPr lang="el-GR" altLang="zh-TW" sz="1600" b="0" i="0" kern="1200" dirty="0" smtClean="0">
-                <a:solidFill>
-                  <a:schemeClr val="tx1"/>
-                </a:solidFill>
-                <a:effectLst/>
-                <a:latin typeface="+mn-lt"/>
-                <a:ea typeface="+mn-ea"/>
-                <a:cs typeface="+mn-cs"/>
-              </a:rPr>
-              <a:t>Ω</a:t>
-            </a:r>
-            <a:r>
-              <a:rPr lang="en-US" altLang="zh-TW" sz="1600" dirty="0" smtClean="0"/>
-              <a:t>&lt;/voice&gt;”””</a:t>
-            </a:r>
+              <a:rPr lang="en-US" altLang="zh-TW" sz="2400" dirty="0" smtClean="0"/>
+              <a:t>//</a:t>
+            </a:r>
+            <a:r>
+              <a:rPr lang="zh-TW" altLang="en-US" sz="2400" dirty="0" smtClean="0"/>
+              <a:t>用法：</a:t>
+            </a:r>
+            <a:endParaRPr lang="en-US" altLang="zh-TW" sz="2400" dirty="0" smtClean="0"/>
           </a:p>
           <a:p>
             <a:pPr marL="0" marR="0" lvl="0" indent="0" algn="l" defTabSz="914400" rtl="0" eaLnBrk="1" fontAlgn="auto" latinLnBrk="0" hangingPunct="1">
@@ -1187,53 +1062,61 @@
               <a:defRPr/>
             </a:pPr>
             <a:r>
-              <a:rPr lang="en-US" altLang="zh-TW" sz="1600" dirty="0" smtClean="0"/>
-              <a:t>Say “””&lt;voice </a:t>
-            </a:r>
-            <a:r>
-              <a:rPr lang="en-US" altLang="zh-TW" sz="1600" dirty="0" err="1" smtClean="0"/>
+              <a:rPr lang="en-US" altLang="zh-TW" sz="2400" dirty="0" smtClean="0"/>
+              <a:t>//</a:t>
+            </a:r>
+            <a:r>
+              <a:rPr lang="en-US" altLang="zh-TW" sz="2400" baseline="0" dirty="0" smtClean="0"/>
+              <a:t>         </a:t>
+            </a:r>
+            <a:r>
+              <a:rPr lang="en-US" altLang="zh-TW" sz="2400" dirty="0" smtClean="0"/>
+              <a:t>Say </a:t>
+            </a:r>
+            <a:r>
+              <a:rPr lang="en-US" altLang="zh-TW" sz="2400" baseline="0" dirty="0" smtClean="0"/>
+              <a:t>  </a:t>
+            </a:r>
+            <a:r>
+              <a:rPr lang="zh-TW" altLang="en-US" sz="2400" b="1" i="1" u="none" baseline="0" dirty="0" smtClean="0"/>
+              <a:t>“”“要說的話”“”</a:t>
+            </a:r>
+            <a:endParaRPr lang="en-US" altLang="zh-TW" sz="2400" b="1" i="1" u="none" dirty="0" smtClean="0"/>
+          </a:p>
+          <a:p>
+            <a:r>
+              <a:rPr lang="en-US" altLang="zh-TW" sz="2400" dirty="0" smtClean="0"/>
+              <a:t>//</a:t>
+            </a:r>
+            <a:r>
+              <a:rPr lang="zh-TW" altLang="en-US" sz="2400" dirty="0" smtClean="0"/>
+              <a:t>建議要說的話可以選擇性前後用 </a:t>
+            </a:r>
+            <a:r>
+              <a:rPr lang="en-US" altLang="zh-TW" sz="2400" dirty="0" smtClean="0"/>
+              <a:t>&lt;voice </a:t>
+            </a:r>
+            <a:r>
+              <a:rPr lang="en-US" altLang="zh-TW" sz="2400" dirty="0" err="1" smtClean="0"/>
               <a:t>xml:lang</a:t>
             </a:r>
             <a:r>
-              <a:rPr lang="en-US" altLang="zh-TW" sz="1600" dirty="0" smtClean="0"/>
-              <a:t>="</a:t>
-            </a:r>
-            <a:r>
-              <a:rPr lang="en-US" altLang="zh-TW" sz="1600" dirty="0" err="1" smtClean="0"/>
-              <a:t>en</a:t>
-            </a:r>
-            <a:r>
-              <a:rPr lang="en-US" altLang="zh-TW" sz="1600" dirty="0" smtClean="0"/>
-              <a:t>-US"&gt;</a:t>
-            </a:r>
-            <a:r>
-              <a:rPr lang="en-US" altLang="zh-TW" sz="1600" b="0" kern="1200" dirty="0" smtClean="0">
-                <a:solidFill>
-                  <a:schemeClr val="tx1"/>
-                </a:solidFill>
-                <a:effectLst/>
-                <a:latin typeface="+mn-lt"/>
-                <a:ea typeface="+mn-ea"/>
-                <a:cs typeface="+mn-cs"/>
-              </a:rPr>
-              <a:t>I can speak </a:t>
-            </a:r>
-            <a:r>
-              <a:rPr lang="en-US" altLang="zh-TW" sz="1600" b="0" i="0" kern="1200" dirty="0" smtClean="0">
-                <a:solidFill>
-                  <a:schemeClr val="tx1"/>
-                </a:solidFill>
-                <a:effectLst/>
-                <a:latin typeface="+mn-lt"/>
-                <a:ea typeface="+mn-ea"/>
-                <a:cs typeface="+mn-cs"/>
-              </a:rPr>
-              <a:t>Omega</a:t>
-            </a:r>
-            <a:r>
-              <a:rPr lang="en-US" altLang="zh-TW" sz="1600" dirty="0" smtClean="0"/>
-              <a:t>&lt;/voice&gt;”””</a:t>
-            </a:r>
+              <a:rPr lang="en-US" altLang="zh-TW" sz="2400" dirty="0" smtClean="0"/>
+              <a:t>=</a:t>
+            </a:r>
+            <a:r>
+              <a:rPr lang="zh-TW" altLang="en-US" sz="2400" dirty="0" smtClean="0"/>
+              <a:t>“使用的語言”</a:t>
+            </a:r>
+            <a:r>
+              <a:rPr lang="en-US" altLang="zh-TW" sz="2400" dirty="0" smtClean="0"/>
+              <a:t>&gt; … &lt;/voice&gt; </a:t>
+            </a:r>
+            <a:r>
+              <a:rPr lang="zh-TW" altLang="en-US" sz="2400" dirty="0" smtClean="0"/>
+              <a:t>包起來，指定使用的語言</a:t>
+            </a:r>
+            <a:endParaRPr lang="en-US" altLang="zh-TW" sz="2400" dirty="0" smtClean="0"/>
           </a:p>
           <a:p>
             <a:pPr marL="0" marR="0" lvl="0" indent="0" algn="l" defTabSz="914400" rtl="0" eaLnBrk="1" fontAlgn="auto" latinLnBrk="0" hangingPunct="1">
@@ -1253,7 +1136,38 @@
               <a:tabLst/>
               <a:defRPr/>
             </a:pPr>
-            <a:endParaRPr lang="en-US" altLang="zh-TW" sz="1600" dirty="0" smtClean="0"/>
+            <a:r>
+              <a:rPr lang="en-US" altLang="zh-TW" sz="2400" dirty="0" smtClean="0"/>
+              <a:t>//</a:t>
+            </a:r>
+            <a:r>
+              <a:rPr lang="zh-TW" altLang="en-US" sz="2400" dirty="0" smtClean="0"/>
+              <a:t>或可以選擇性加 </a:t>
+            </a:r>
+            <a:r>
+              <a:rPr lang="en-US" altLang="zh-TW" sz="2400" dirty="0" smtClean="0"/>
+              <a:t>gender=”male” </a:t>
+            </a:r>
+            <a:r>
+              <a:rPr lang="zh-TW" altLang="en-US" sz="2400" dirty="0" smtClean="0"/>
+              <a:t>或 </a:t>
+            </a:r>
+            <a:r>
+              <a:rPr lang="en-US" altLang="zh-TW" sz="2400" dirty="0" smtClean="0"/>
+              <a:t>gender=”female“</a:t>
+            </a:r>
+            <a:r>
+              <a:rPr lang="en-US" altLang="zh-TW" sz="2400" baseline="0" dirty="0" smtClean="0"/>
+              <a:t> </a:t>
+            </a:r>
+            <a:r>
+              <a:rPr lang="zh-TW" altLang="en-US" sz="2400" baseline="0" dirty="0" smtClean="0"/>
+              <a:t>指定性別。例如：</a:t>
+            </a:r>
+            <a:endParaRPr lang="en-US" altLang="zh-TW" sz="2400" dirty="0" smtClean="0"/>
+          </a:p>
+          <a:p>
+            <a:endParaRPr lang="en-US" altLang="zh-TW" sz="2400" dirty="0" smtClean="0"/>
           </a:p>
           <a:p>
             <a:pPr marL="0" marR="0" lvl="0" indent="0" algn="l" defTabSz="914400" rtl="0" eaLnBrk="1" fontAlgn="auto" latinLnBrk="0" hangingPunct="1">
@@ -1274,53 +1188,89 @@
               <a:defRPr/>
             </a:pPr>
             <a:r>
-              <a:rPr lang="en-US" altLang="zh-TW" sz="1600" dirty="0" smtClean="0"/>
-              <a:t>Say “””&lt;voice </a:t>
-            </a:r>
-            <a:r>
-              <a:rPr lang="en-US" altLang="zh-TW" sz="1600" dirty="0" err="1" smtClean="0"/>
+              <a:rPr lang="en-US" altLang="zh-TW" sz="2400" dirty="0" smtClean="0"/>
+              <a:t>Say   “”” I am David “””                                                                                                      //</a:t>
+            </a:r>
+            <a:r>
+              <a:rPr lang="zh-TW" altLang="en-US" sz="2400" dirty="0" smtClean="0"/>
+              <a:t>用系統預設語言說 </a:t>
+            </a:r>
+            <a:r>
+              <a:rPr lang="en-US" altLang="zh-TW" sz="2400" dirty="0" smtClean="0"/>
+              <a:t>I am</a:t>
+            </a:r>
+            <a:r>
+              <a:rPr lang="en-US" altLang="zh-TW" sz="2400" baseline="0" dirty="0" smtClean="0"/>
+              <a:t> David</a:t>
+            </a:r>
+            <a:endParaRPr lang="en-US" altLang="zh-TW" sz="2400" dirty="0" smtClean="0"/>
+          </a:p>
+          <a:p>
+            <a:r>
+              <a:rPr lang="en-US" altLang="zh-TW" sz="2400" dirty="0" smtClean="0"/>
+              <a:t>Say   “””&lt;voice </a:t>
+            </a:r>
+            <a:r>
+              <a:rPr lang="en-US" altLang="zh-TW" sz="2400" dirty="0" err="1" smtClean="0"/>
               <a:t>xml:lang</a:t>
             </a:r>
             <a:r>
-              <a:rPr lang="en-US" altLang="zh-TW" sz="1600" dirty="0" smtClean="0"/>
-              <a:t>="</a:t>
-            </a:r>
-            <a:r>
-              <a:rPr lang="en-US" altLang="zh-TW" sz="1600" dirty="0" err="1" smtClean="0"/>
+              <a:rPr lang="en-US" altLang="zh-TW" sz="2400" dirty="0" smtClean="0"/>
+              <a:t>=“</a:t>
+            </a:r>
+            <a:r>
+              <a:rPr lang="en-US" altLang="zh-TW" sz="2400" dirty="0" err="1" smtClean="0"/>
               <a:t>en</a:t>
             </a:r>
             <a:r>
-              <a:rPr lang="en-US" altLang="zh-TW" sz="1600" dirty="0" smtClean="0"/>
-              <a:t>-US"&gt;</a:t>
-            </a:r>
-            <a:r>
-              <a:rPr lang="en-US" altLang="zh-TW" sz="1600" b="0" kern="1200" dirty="0" smtClean="0">
-                <a:solidFill>
-                  <a:schemeClr val="tx1"/>
-                </a:solidFill>
-                <a:effectLst/>
-                <a:latin typeface="+mn-lt"/>
-                <a:ea typeface="+mn-ea"/>
-                <a:cs typeface="+mn-cs"/>
-              </a:rPr>
-              <a:t>I can speak \</a:t>
-            </a:r>
-            <a:r>
-              <a:rPr lang="el-GR" altLang="zh-TW" sz="1600" b="0" kern="1200" dirty="0" smtClean="0">
-                <a:solidFill>
-                  <a:schemeClr val="tx1"/>
-                </a:solidFill>
-                <a:effectLst/>
-                <a:latin typeface="+mn-lt"/>
-                <a:ea typeface="+mn-ea"/>
-                <a:cs typeface="+mn-cs"/>
-              </a:rPr>
-              <a:t>ι</a:t>
-            </a:r>
-            <a:r>
-              <a:rPr lang="en-US" altLang="zh-TW" sz="1600" dirty="0" smtClean="0"/>
-              <a:t>&lt;/voice&gt;”””</a:t>
-            </a:r>
+              <a:rPr lang="en-US" altLang="zh-TW" sz="2400" dirty="0" smtClean="0"/>
+              <a:t>-US“   gender=”male“&gt;I am David &lt;/voice&gt;”””    //</a:t>
+            </a:r>
+            <a:r>
+              <a:rPr lang="zh-TW" altLang="en-US" sz="2400" dirty="0" smtClean="0"/>
+              <a:t>用美式英文</a:t>
+            </a:r>
+            <a:r>
+              <a:rPr lang="en-US" altLang="zh-TW" sz="2400" dirty="0" smtClean="0"/>
+              <a:t>(</a:t>
+            </a:r>
+            <a:r>
+              <a:rPr lang="en-US" altLang="zh-TW" sz="2400" dirty="0" err="1" smtClean="0"/>
+              <a:t>xml:lang</a:t>
+            </a:r>
+            <a:r>
+              <a:rPr lang="en-US" altLang="zh-TW" sz="2400" dirty="0" smtClean="0"/>
+              <a:t>=“</a:t>
+            </a:r>
+            <a:r>
+              <a:rPr lang="en-US" altLang="zh-TW" sz="2400" dirty="0" err="1" smtClean="0"/>
+              <a:t>en</a:t>
+            </a:r>
+            <a:r>
+              <a:rPr lang="en-US" altLang="zh-TW" sz="2400" dirty="0" smtClean="0"/>
+              <a:t>-US“)</a:t>
+            </a:r>
+            <a:r>
+              <a:rPr lang="zh-TW" altLang="en-US" sz="2400" dirty="0" smtClean="0"/>
+              <a:t>、男聲</a:t>
+            </a:r>
+            <a:r>
+              <a:rPr lang="en-US" altLang="zh-TW" sz="2400" dirty="0" smtClean="0"/>
+              <a:t>(gender=”male“)</a:t>
+            </a:r>
+            <a:r>
+              <a:rPr lang="zh-TW" altLang="en-US" sz="2400" dirty="0" smtClean="0"/>
+              <a:t>說 </a:t>
+            </a:r>
+            <a:r>
+              <a:rPr lang="en-US" altLang="zh-TW" sz="2400" dirty="0" smtClean="0"/>
+              <a:t>I am</a:t>
+            </a:r>
+            <a:r>
+              <a:rPr lang="en-US" altLang="zh-TW" sz="2400" baseline="0" dirty="0" smtClean="0"/>
+              <a:t> David</a:t>
+            </a:r>
+            <a:endParaRPr lang="en-US" altLang="zh-TW" sz="2400" dirty="0" smtClean="0"/>
           </a:p>
           <a:p>
             <a:pPr marL="0" marR="0" lvl="0" indent="0" algn="l" defTabSz="914400" rtl="0" eaLnBrk="1" fontAlgn="auto" latinLnBrk="0" hangingPunct="1">
@@ -1341,109 +1291,70 @@
               <a:defRPr/>
             </a:pPr>
             <a:r>
-              <a:rPr lang="en-US" altLang="zh-TW" sz="1600" dirty="0" smtClean="0"/>
-              <a:t>Say “””&lt;voice </a:t>
-            </a:r>
-            <a:r>
-              <a:rPr lang="en-US" altLang="zh-TW" sz="1600" dirty="0" err="1" smtClean="0"/>
+              <a:rPr lang="en-US" altLang="zh-TW" sz="2400" dirty="0" smtClean="0"/>
+              <a:t>Say   “””&lt;voice </a:t>
+            </a:r>
+            <a:r>
+              <a:rPr lang="en-US" altLang="zh-TW" sz="2400" dirty="0" err="1" smtClean="0"/>
               <a:t>xml:lang</a:t>
             </a:r>
             <a:r>
-              <a:rPr lang="en-US" altLang="zh-TW" sz="1600" dirty="0" smtClean="0"/>
-              <a:t>="</a:t>
-            </a:r>
-            <a:r>
-              <a:rPr lang="en-US" altLang="zh-TW" sz="1600" dirty="0" err="1" smtClean="0"/>
-              <a:t>en</a:t>
-            </a:r>
-            <a:r>
-              <a:rPr lang="en-US" altLang="zh-TW" sz="1600" dirty="0" smtClean="0"/>
-              <a:t>-US"&gt;</a:t>
-            </a:r>
-            <a:r>
-              <a:rPr lang="en-US" altLang="zh-TW" sz="1600" b="0" kern="1200" dirty="0" smtClean="0">
-                <a:solidFill>
-                  <a:schemeClr val="tx1"/>
-                </a:solidFill>
-                <a:effectLst/>
-                <a:latin typeface="+mn-lt"/>
-                <a:ea typeface="+mn-ea"/>
-                <a:cs typeface="+mn-cs"/>
-              </a:rPr>
-              <a:t>I can speak \Iota</a:t>
-            </a:r>
-            <a:r>
-              <a:rPr lang="en-US" altLang="zh-TW" sz="1600" dirty="0" smtClean="0"/>
-              <a:t>&lt;/voice&gt;”””</a:t>
-            </a:r>
-          </a:p>
-          <a:p>
-            <a:endParaRPr lang="en-US" altLang="zh-TW" sz="1600" dirty="0" smtClean="0"/>
-          </a:p>
-          <a:p>
-            <a:r>
-              <a:rPr lang="en-US" altLang="zh-TW" sz="1600" dirty="0" smtClean="0"/>
-              <a:t>//Transpose</a:t>
-            </a:r>
-            <a:r>
-              <a:rPr lang="zh-TW" altLang="en-US" sz="1600" dirty="0" smtClean="0"/>
-              <a:t>指令：用來進行方程式的演變</a:t>
-            </a:r>
-            <a:endParaRPr lang="en-US" altLang="zh-TW" sz="1600" dirty="0" smtClean="0"/>
-          </a:p>
-          <a:p>
-            <a:r>
-              <a:rPr lang="en-US" altLang="zh-TW" sz="1600" dirty="0" smtClean="0"/>
-              <a:t>//</a:t>
-            </a:r>
-            <a:r>
-              <a:rPr lang="zh-TW" altLang="en-US" sz="1600" dirty="0" smtClean="0"/>
-              <a:t>用法：</a:t>
-            </a:r>
-            <a:endParaRPr lang="en-US" altLang="zh-TW" sz="1600" dirty="0" smtClean="0"/>
-          </a:p>
-          <a:p>
-            <a:r>
-              <a:rPr lang="en-US" altLang="zh-TW" sz="1600" dirty="0" smtClean="0"/>
-              <a:t>//</a:t>
-            </a:r>
-            <a:r>
-              <a:rPr lang="en-US" altLang="zh-TW" sz="1600" baseline="0" dirty="0" smtClean="0"/>
-              <a:t>         1. Replace</a:t>
-            </a:r>
-            <a:r>
-              <a:rPr lang="zh-TW" altLang="en-US" sz="1600" baseline="0" dirty="0" smtClean="0"/>
-              <a:t>功能：  </a:t>
-            </a:r>
-            <a:r>
-              <a:rPr lang="en-US" altLang="zh-TW" sz="1600" baseline="0" dirty="0" smtClean="0"/>
-              <a:t>Transpose &lt;TeX4Office</a:t>
-            </a:r>
-            <a:r>
-              <a:rPr lang="zh-TW" altLang="en-US" sz="1600" baseline="0" dirty="0" smtClean="0"/>
-              <a:t>物件名</a:t>
-            </a:r>
-            <a:r>
-              <a:rPr lang="en-US" altLang="zh-TW" sz="1600" baseline="0" dirty="0" smtClean="0"/>
-              <a:t>&gt; replace &lt;</a:t>
-            </a:r>
-            <a:r>
-              <a:rPr lang="zh-TW" altLang="en-US" sz="1600" baseline="0" dirty="0" smtClean="0"/>
-              <a:t>欲取代子字串</a:t>
-            </a:r>
-            <a:r>
-              <a:rPr lang="en-US" altLang="zh-TW" sz="1600" baseline="0" dirty="0" smtClean="0"/>
-              <a:t>&gt; &lt;</a:t>
-            </a:r>
-            <a:r>
-              <a:rPr lang="zh-TW" altLang="en-US" sz="1600" baseline="0" dirty="0" smtClean="0"/>
-              <a:t>用來取代的新字串</a:t>
-            </a:r>
-            <a:r>
-              <a:rPr lang="en-US" altLang="zh-TW" sz="1600" baseline="0" dirty="0" smtClean="0"/>
-              <a:t>&gt;</a:t>
-            </a:r>
-            <a:endParaRPr lang="en-US" altLang="zh-TW" sz="1600" dirty="0" smtClean="0"/>
+              <a:rPr lang="en-US" altLang="zh-TW" sz="2400" dirty="0" smtClean="0"/>
+              <a:t>=“</a:t>
+            </a:r>
+            <a:r>
+              <a:rPr lang="en-US" altLang="zh-TW" sz="2400" dirty="0" err="1" smtClean="0"/>
+              <a:t>zh</a:t>
+            </a:r>
+            <a:r>
+              <a:rPr lang="en-US" altLang="zh-TW" sz="2400" dirty="0" smtClean="0"/>
+              <a:t>-TW“   gender=”female“&gt;</a:t>
+            </a:r>
+            <a:r>
+              <a:rPr lang="zh-TW" altLang="en-US" sz="2400" dirty="0" smtClean="0"/>
+              <a:t>我是大衛</a:t>
+            </a:r>
+            <a:r>
+              <a:rPr lang="en-US" altLang="zh-TW" sz="2400" dirty="0" smtClean="0"/>
+              <a:t>&lt;/voice&gt;”””     //</a:t>
+            </a:r>
+            <a:r>
+              <a:rPr lang="zh-TW" altLang="en-US" sz="2400" dirty="0" smtClean="0"/>
+              <a:t>用台灣口音中文</a:t>
+            </a:r>
+            <a:r>
+              <a:rPr lang="en-US" altLang="zh-TW" sz="2400" dirty="0" smtClean="0"/>
+              <a:t>(</a:t>
+            </a:r>
+            <a:r>
+              <a:rPr lang="en-US" altLang="zh-TW" sz="2400" dirty="0" err="1" smtClean="0"/>
+              <a:t>xml:lang</a:t>
+            </a:r>
+            <a:r>
+              <a:rPr lang="en-US" altLang="zh-TW" sz="2400" dirty="0" smtClean="0"/>
+              <a:t>=“</a:t>
+            </a:r>
+            <a:r>
+              <a:rPr lang="en-US" altLang="zh-TW" sz="2400" dirty="0" err="1" smtClean="0"/>
+              <a:t>zh</a:t>
+            </a:r>
+            <a:r>
+              <a:rPr lang="en-US" altLang="zh-TW" sz="2400" dirty="0" smtClean="0"/>
+              <a:t>-TW“)</a:t>
+            </a:r>
+            <a:r>
+              <a:rPr lang="zh-TW" altLang="en-US" sz="2400" dirty="0" smtClean="0"/>
+              <a:t>、女聲</a:t>
+            </a:r>
+            <a:r>
+              <a:rPr lang="en-US" altLang="zh-TW" sz="2400" dirty="0" smtClean="0"/>
+              <a:t>(gender=”female“)</a:t>
+            </a:r>
+            <a:r>
+              <a:rPr lang="zh-TW" altLang="en-US" sz="2400" dirty="0" smtClean="0"/>
+              <a:t>說 我是大衛</a:t>
+            </a:r>
+            <a:endParaRPr lang="en-US" altLang="zh-TW" sz="2400" dirty="0" smtClean="0"/>
           </a:p>
           <a:p>
             <a:pPr marL="0" marR="0" lvl="0" indent="0" algn="l" defTabSz="914400" rtl="0" eaLnBrk="1" fontAlgn="auto" latinLnBrk="0" hangingPunct="1">
@@ -1464,54 +1375,27 @@
               <a:defRPr/>
             </a:pPr>
             <a:r>
-              <a:rPr lang="en-US" altLang="zh-TW" sz="1600" baseline="0" dirty="0" smtClean="0"/>
-              <a:t>Transpose   tex4office_obj23119   replace “””x^2+2x+1”””   “””(x+1)^2”””</a:t>
-            </a:r>
-            <a:endParaRPr lang="en-US" altLang="zh-TW" sz="1600" dirty="0" smtClean="0"/>
-          </a:p>
-          <a:p>
-            <a:endParaRPr lang="en-US" altLang="zh-TW" sz="1600" dirty="0" smtClean="0"/>
-          </a:p>
-          <a:p>
-            <a:r>
-              <a:rPr lang="en-US" altLang="zh-TW" sz="1600" dirty="0" smtClean="0"/>
-              <a:t>//Point</a:t>
-            </a:r>
-            <a:r>
-              <a:rPr lang="zh-TW" altLang="en-US" sz="1600" dirty="0" smtClean="0"/>
-              <a:t>指令：產生雷射筆效果</a:t>
-            </a:r>
-            <a:endParaRPr lang="en-US" altLang="zh-TW" sz="1600" dirty="0" smtClean="0"/>
-          </a:p>
-          <a:p>
-            <a:r>
-              <a:rPr lang="en-US" altLang="zh-TW" sz="1600" dirty="0" smtClean="0"/>
-              <a:t>//</a:t>
-            </a:r>
-            <a:r>
-              <a:rPr lang="zh-TW" altLang="en-US" sz="1600" dirty="0" smtClean="0"/>
-              <a:t>用法：</a:t>
-            </a:r>
-            <a:endParaRPr lang="en-US" altLang="zh-TW" sz="1600" dirty="0" smtClean="0"/>
-          </a:p>
-          <a:p>
-            <a:r>
-              <a:rPr lang="en-US" altLang="zh-TW" sz="1600" dirty="0" smtClean="0"/>
-              <a:t>//</a:t>
-            </a:r>
-            <a:r>
-              <a:rPr lang="en-US" altLang="zh-TW" sz="1600" baseline="0" dirty="0" smtClean="0"/>
-              <a:t>         Point &lt;X position&gt; &lt;Y position&gt; &lt;Type&gt; &lt;Color&gt; [&lt;Width&gt; &lt;Height&gt;]</a:t>
-            </a:r>
-            <a:endParaRPr lang="en-US" altLang="zh-TW" sz="1600" dirty="0" smtClean="0"/>
-          </a:p>
-          <a:p>
-            <a:r>
-              <a:rPr lang="en-US" altLang="zh-TW" sz="1600" baseline="0" dirty="0" smtClean="0"/>
-              <a:t>point   0.5  0.5  circle  </a:t>
-            </a:r>
-            <a:r>
-              <a:rPr lang="en-US" altLang="zh-TW" sz="1600" b="0" kern="1200" dirty="0" smtClean="0">
+              <a:rPr lang="en-US" altLang="zh-TW" sz="2400" dirty="0" smtClean="0"/>
+              <a:t>Say   “””&lt;voice </a:t>
+            </a:r>
+            <a:r>
+              <a:rPr lang="en-US" altLang="zh-TW" sz="2400" dirty="0" err="1" smtClean="0"/>
+              <a:t>xml:lang</a:t>
+            </a:r>
+            <a:r>
+              <a:rPr lang="en-US" altLang="zh-TW" sz="2400" dirty="0" smtClean="0"/>
+              <a:t>=“</a:t>
+            </a:r>
+            <a:r>
+              <a:rPr lang="en-US" altLang="zh-TW" sz="2400" dirty="0" err="1" smtClean="0"/>
+              <a:t>en</a:t>
+            </a:r>
+            <a:r>
+              <a:rPr lang="en-US" altLang="zh-TW" sz="2400" dirty="0" smtClean="0"/>
+              <a:t>-US”&gt;</a:t>
+            </a:r>
+            <a:r>
+              <a:rPr lang="en-US" altLang="zh-TW" sz="2400" b="0" kern="1200" dirty="0" smtClean="0">
                 <a:solidFill>
                   <a:schemeClr val="tx1"/>
                 </a:solidFill>
@@ -1520,35 +1404,77 @@
                 <a:ea typeface="+mn-ea"/>
                 <a:cs typeface="+mn-cs"/>
               </a:rPr>
-              <a:t>cyan</a:t>
-            </a:r>
-          </a:p>
-          <a:p>
-            <a:endParaRPr lang="en-US" altLang="zh-TW" sz="1600" dirty="0" smtClean="0"/>
-          </a:p>
-          <a:p>
-            <a:r>
-              <a:rPr lang="en-US" altLang="zh-TW" sz="1600" dirty="0" smtClean="0"/>
-              <a:t>/*</a:t>
-            </a:r>
-          </a:p>
-          <a:p>
-            <a:r>
-              <a:rPr lang="en-US" altLang="zh-TW" sz="1600" dirty="0" smtClean="0"/>
-              <a:t>//TODOs</a:t>
-            </a:r>
-          </a:p>
-          <a:p>
-            <a:r>
-              <a:rPr lang="en-US" altLang="zh-TW" sz="1600" dirty="0" smtClean="0"/>
-              <a:t>Say  tex4office_obj23119</a:t>
-            </a:r>
-          </a:p>
-          <a:p>
-            <a:r>
-              <a:rPr lang="en-US" altLang="zh-TW" sz="1600" baseline="0" dirty="0" smtClean="0"/>
-              <a:t>Transpose   tex4office_obj23119   replace   \sublabel{term1} {x^2+2x+1}   (x+1)^2</a:t>
-            </a:r>
+              <a:t>I can speak α </a:t>
+            </a:r>
+            <a:r>
+              <a:rPr lang="el-GR" altLang="zh-TW" sz="2400" b="0" kern="1200" dirty="0" smtClean="0">
+                <a:solidFill>
+                  <a:schemeClr val="tx1"/>
+                </a:solidFill>
+                <a:effectLst/>
+                <a:latin typeface="+mn-lt"/>
+                <a:ea typeface="+mn-ea"/>
+                <a:cs typeface="+mn-cs"/>
+              </a:rPr>
+              <a:t>π</a:t>
+            </a:r>
+            <a:r>
+              <a:rPr lang="en-US" altLang="zh-TW" sz="2400" b="0" kern="1200" dirty="0" smtClean="0">
+                <a:solidFill>
+                  <a:schemeClr val="tx1"/>
+                </a:solidFill>
+                <a:effectLst/>
+                <a:latin typeface="+mn-lt"/>
+                <a:ea typeface="+mn-ea"/>
+                <a:cs typeface="+mn-cs"/>
+              </a:rPr>
+              <a:t> </a:t>
+            </a:r>
+            <a:r>
+              <a:rPr lang="el-GR" altLang="zh-TW" sz="2400" b="0" i="0" kern="1200" dirty="0" smtClean="0">
+                <a:solidFill>
+                  <a:schemeClr val="tx1"/>
+                </a:solidFill>
+                <a:effectLst/>
+                <a:latin typeface="+mn-lt"/>
+                <a:ea typeface="+mn-ea"/>
+                <a:cs typeface="+mn-cs"/>
+              </a:rPr>
+              <a:t>Ω</a:t>
+            </a:r>
+            <a:r>
+              <a:rPr lang="en-US" altLang="zh-TW" sz="2400" dirty="0" smtClean="0"/>
+              <a:t>&lt;/voice&gt;”””                         //</a:t>
+            </a:r>
+            <a:r>
+              <a:rPr lang="zh-TW" altLang="en-US" sz="2400" dirty="0" smtClean="0"/>
+              <a:t>用美式英文</a:t>
+            </a:r>
+            <a:r>
+              <a:rPr lang="en-US" altLang="zh-TW" sz="2400" dirty="0" smtClean="0"/>
+              <a:t>(</a:t>
+            </a:r>
+            <a:r>
+              <a:rPr lang="en-US" altLang="zh-TW" sz="2400" dirty="0" err="1" smtClean="0"/>
+              <a:t>xml:lang</a:t>
+            </a:r>
+            <a:r>
+              <a:rPr lang="en-US" altLang="zh-TW" sz="2400" dirty="0" smtClean="0"/>
+              <a:t>=“</a:t>
+            </a:r>
+            <a:r>
+              <a:rPr lang="en-US" altLang="zh-TW" sz="2400" dirty="0" err="1" smtClean="0"/>
+              <a:t>en</a:t>
+            </a:r>
+            <a:r>
+              <a:rPr lang="en-US" altLang="zh-TW" sz="2400" dirty="0" smtClean="0"/>
+              <a:t>-US“) </a:t>
+            </a:r>
+            <a:r>
+              <a:rPr lang="zh-TW" altLang="en-US" sz="2400" dirty="0" smtClean="0"/>
+              <a:t>可以正常說出希臘符號</a:t>
+            </a:r>
+            <a:endParaRPr lang="en-US" altLang="zh-TW" sz="2400" dirty="0" smtClean="0"/>
           </a:p>
           <a:p>
             <a:pPr marL="0" marR="0" lvl="0" indent="0" algn="l" defTabSz="914400" rtl="0" eaLnBrk="1" fontAlgn="auto" latinLnBrk="0" hangingPunct="1">
@@ -1568,10 +1494,7 @@
               <a:tabLst/>
               <a:defRPr/>
             </a:pPr>
-            <a:r>
-              <a:rPr lang="en-US" altLang="zh-TW" sz="1600" baseline="0" dirty="0" smtClean="0"/>
-              <a:t>Transpose   tex4office_obj23119   replace   \sublabel{term1}   (x+1)^2</a:t>
-            </a:r>
+            <a:endParaRPr lang="en-US" altLang="zh-TW" sz="2400" dirty="0" smtClean="0"/>
           </a:p>
           <a:p>
             <a:pPr marL="0" marR="0" lvl="0" indent="0" algn="l" defTabSz="914400" rtl="0" eaLnBrk="1" fontAlgn="auto" latinLnBrk="0" hangingPunct="1">
@@ -1592,8 +1515,86 @@
               <a:defRPr/>
             </a:pPr>
             <a:r>
-              <a:rPr lang="en-US" altLang="zh-TW" sz="1600" baseline="0" dirty="0" smtClean="0"/>
-              <a:t>point   0.5  0.5  circle  red</a:t>
+              <a:rPr lang="en-US" altLang="zh-TW" sz="2400" dirty="0" smtClean="0"/>
+              <a:t>//Transpose</a:t>
+            </a:r>
+            <a:r>
+              <a:rPr lang="zh-TW" altLang="en-US" sz="2400" dirty="0" smtClean="0"/>
+              <a:t>指令：用來進行方程式的演變</a:t>
+            </a:r>
+            <a:endParaRPr lang="en-US" altLang="zh-TW" sz="2400" dirty="0" smtClean="0"/>
+          </a:p>
+          <a:p>
+            <a:r>
+              <a:rPr lang="en-US" altLang="zh-TW" sz="2400" dirty="0" smtClean="0"/>
+              <a:t>//</a:t>
+            </a:r>
+            <a:r>
+              <a:rPr lang="zh-TW" altLang="en-US" sz="2400" dirty="0" smtClean="0"/>
+              <a:t>用法：</a:t>
+            </a:r>
+            <a:endParaRPr lang="en-US" altLang="zh-TW" sz="2400" dirty="0" smtClean="0"/>
+          </a:p>
+          <a:p>
+            <a:r>
+              <a:rPr lang="en-US" altLang="zh-TW" sz="2400" dirty="0" smtClean="0"/>
+              <a:t>//</a:t>
+            </a:r>
+            <a:r>
+              <a:rPr lang="en-US" altLang="zh-TW" sz="2400" baseline="0" dirty="0" smtClean="0"/>
+              <a:t>         1. Replace</a:t>
+            </a:r>
+            <a:r>
+              <a:rPr lang="zh-TW" altLang="en-US" sz="2400" baseline="0" dirty="0" smtClean="0"/>
+              <a:t>功能：  </a:t>
+            </a:r>
+            <a:r>
+              <a:rPr lang="en-US" altLang="zh-TW" sz="2400" baseline="0" dirty="0" smtClean="0"/>
+              <a:t>Transpose </a:t>
+            </a:r>
+            <a:r>
+              <a:rPr lang="en-US" altLang="zh-TW" sz="2400" b="1" i="1" u="none" baseline="0" dirty="0" smtClean="0"/>
+              <a:t>&lt;</a:t>
+            </a:r>
+            <a:r>
+              <a:rPr lang="en-US" altLang="zh-TW" sz="2400" b="1" i="1" u="sng" baseline="0" dirty="0" smtClean="0"/>
+              <a:t>TeX4Office</a:t>
+            </a:r>
+            <a:r>
+              <a:rPr lang="zh-TW" altLang="en-US" sz="2400" b="1" i="1" u="sng" baseline="0" dirty="0" smtClean="0"/>
+              <a:t>物件名</a:t>
+            </a:r>
+            <a:r>
+              <a:rPr lang="en-US" altLang="zh-TW" sz="2400" b="1" i="1" u="none" baseline="0" dirty="0" smtClean="0"/>
+              <a:t>&gt;</a:t>
+            </a:r>
+            <a:r>
+              <a:rPr lang="en-US" altLang="zh-TW" sz="2400" b="1" i="1" u="sng" baseline="0" dirty="0" smtClean="0"/>
+              <a:t> </a:t>
+            </a:r>
+            <a:r>
+              <a:rPr lang="en-US" altLang="zh-TW" sz="2400" baseline="0" dirty="0" smtClean="0"/>
+              <a:t>replace </a:t>
+            </a:r>
+            <a:r>
+              <a:rPr lang="en-US" altLang="zh-TW" sz="2400" b="1" i="1" u="none" baseline="0" dirty="0" smtClean="0"/>
+              <a:t>&lt;</a:t>
+            </a:r>
+            <a:r>
+              <a:rPr lang="zh-TW" altLang="en-US" sz="2400" b="1" i="1" u="sng" baseline="0" dirty="0" smtClean="0"/>
+              <a:t>欲取代子字串</a:t>
+            </a:r>
+            <a:r>
+              <a:rPr lang="en-US" altLang="zh-TW" sz="2400" b="1" i="1" u="none" baseline="0" dirty="0" smtClean="0"/>
+              <a:t>&gt; &lt;</a:t>
+            </a:r>
+            <a:r>
+              <a:rPr lang="zh-TW" altLang="en-US" sz="2400" b="1" i="1" u="sng" baseline="0" dirty="0" smtClean="0"/>
+              <a:t>用來取代的新字串</a:t>
+            </a:r>
+            <a:r>
+              <a:rPr lang="en-US" altLang="zh-TW" sz="2400" b="1" i="1" u="none" baseline="0" dirty="0" smtClean="0"/>
+              <a:t>&gt;</a:t>
             </a:r>
           </a:p>
           <a:p>
@@ -1615,9 +1616,143 @@
               <a:defRPr/>
             </a:pPr>
             <a:r>
-              <a:rPr lang="en-US" altLang="zh-TW" sz="1600" baseline="0" dirty="0" smtClean="0"/>
-              <a:t>point   0.5  0.5  circle  red 5 5</a:t>
-            </a:r>
+              <a:rPr lang="en-US" altLang="zh-TW" sz="2400" baseline="0" dirty="0" smtClean="0"/>
+              <a:t>//                                          </a:t>
+            </a:r>
+            <a:r>
+              <a:rPr lang="en-US" altLang="zh-TW" sz="2400" b="1" i="1" u="sng" baseline="0" dirty="0" smtClean="0">
+                <a:solidFill>
+                  <a:srgbClr val="FF0000"/>
+                </a:solidFill>
+                <a:effectLst/>
+              </a:rPr>
+              <a:t>TeX4Office</a:t>
+            </a:r>
+            <a:r>
+              <a:rPr lang="zh-TW" altLang="en-US" sz="2400" b="1" i="1" u="sng" baseline="0" dirty="0" smtClean="0">
+                <a:solidFill>
+                  <a:srgbClr val="FF0000"/>
+                </a:solidFill>
+                <a:effectLst/>
+              </a:rPr>
+              <a:t>物件名 </a:t>
+            </a:r>
+            <a:r>
+              <a:rPr lang="zh-TW" altLang="en-US" sz="2400" baseline="0" dirty="0" smtClean="0"/>
+              <a:t>請參考 </a:t>
+            </a:r>
+            <a:r>
+              <a:rPr lang="en-US" altLang="zh-TW" sz="2400" kern="1200" dirty="0" smtClean="0">
+                <a:solidFill>
+                  <a:schemeClr val="tx1"/>
+                </a:solidFill>
+                <a:effectLst/>
+                <a:latin typeface="+mn-lt"/>
+                <a:ea typeface="+mn-ea"/>
+                <a:cs typeface="+mn-cs"/>
+              </a:rPr>
+              <a:t>Perfect Lecture </a:t>
+            </a:r>
+            <a:r>
+              <a:rPr lang="zh-TW" altLang="zh-TW" sz="2400" kern="1200" dirty="0" smtClean="0">
+                <a:solidFill>
+                  <a:schemeClr val="tx1"/>
+                </a:solidFill>
+                <a:effectLst/>
+                <a:latin typeface="+mn-lt"/>
+                <a:ea typeface="+mn-ea"/>
+                <a:cs typeface="+mn-cs"/>
+              </a:rPr>
+              <a:t>使用手冊</a:t>
+            </a:r>
+            <a:r>
+              <a:rPr lang="zh-TW" altLang="en-US" sz="2400" kern="1200" dirty="0" smtClean="0">
+                <a:solidFill>
+                  <a:schemeClr val="tx1"/>
+                </a:solidFill>
+                <a:effectLst/>
+                <a:latin typeface="+mn-lt"/>
+                <a:ea typeface="+mn-ea"/>
+                <a:cs typeface="+mn-cs"/>
+              </a:rPr>
+              <a:t>中 </a:t>
+            </a:r>
+            <a:r>
+              <a:rPr lang="zh-TW" altLang="zh-TW" sz="2400" b="1" kern="1200" dirty="0" smtClean="0">
+                <a:solidFill>
+                  <a:schemeClr val="tx1"/>
+                </a:solidFill>
+                <a:effectLst/>
+                <a:latin typeface="+mn-lt"/>
+                <a:ea typeface="+mn-ea"/>
+                <a:cs typeface="+mn-cs"/>
+              </a:rPr>
+              <a:t>功能二、新增</a:t>
+            </a:r>
+            <a:r>
+              <a:rPr lang="en-US" altLang="zh-TW" sz="2400" b="1" kern="1200" dirty="0" err="1" smtClean="0">
+                <a:solidFill>
+                  <a:schemeClr val="tx1"/>
+                </a:solidFill>
+                <a:effectLst/>
+                <a:latin typeface="+mn-lt"/>
+                <a:ea typeface="+mn-ea"/>
+                <a:cs typeface="+mn-cs"/>
+              </a:rPr>
+              <a:t>LaTeX</a:t>
+            </a:r>
+            <a:r>
+              <a:rPr lang="zh-TW" altLang="zh-TW" sz="2400" b="1" kern="1200" dirty="0" smtClean="0">
+                <a:solidFill>
+                  <a:schemeClr val="tx1"/>
+                </a:solidFill>
+                <a:effectLst/>
+                <a:latin typeface="+mn-lt"/>
+                <a:ea typeface="+mn-ea"/>
+                <a:cs typeface="+mn-cs"/>
+              </a:rPr>
+              <a:t>輸出圖片</a:t>
+            </a:r>
+            <a:r>
+              <a:rPr lang="en-US" altLang="zh-TW" sz="2400" b="1" kern="1200" dirty="0" smtClean="0">
+                <a:solidFill>
+                  <a:schemeClr val="tx1"/>
+                </a:solidFill>
+                <a:effectLst/>
+                <a:latin typeface="+mn-lt"/>
+                <a:ea typeface="+mn-ea"/>
+                <a:cs typeface="+mn-cs"/>
+              </a:rPr>
+              <a:t> </a:t>
+            </a:r>
+            <a:r>
+              <a:rPr lang="zh-TW" altLang="en-US" sz="2400" b="1" kern="1200" dirty="0" smtClean="0">
+                <a:solidFill>
+                  <a:schemeClr val="tx1"/>
+                </a:solidFill>
+                <a:effectLst/>
+                <a:latin typeface="+mn-lt"/>
+                <a:ea typeface="+mn-ea"/>
+                <a:cs typeface="+mn-cs"/>
+              </a:rPr>
+              <a:t>步驟</a:t>
+            </a:r>
+            <a:r>
+              <a:rPr lang="en-US" altLang="zh-TW" sz="2400" b="1" kern="1200" dirty="0" smtClean="0">
+                <a:solidFill>
+                  <a:schemeClr val="tx1"/>
+                </a:solidFill>
+                <a:effectLst/>
+                <a:latin typeface="+mn-lt"/>
+                <a:ea typeface="+mn-ea"/>
+                <a:cs typeface="+mn-cs"/>
+              </a:rPr>
+              <a:t>1~3</a:t>
+            </a:r>
+            <a:endParaRPr lang="en-US" altLang="zh-TW" sz="2400" dirty="0" smtClean="0"/>
+          </a:p>
+          <a:p>
+            <a:endParaRPr lang="en-US" altLang="zh-TW" sz="2400" dirty="0" smtClean="0"/>
           </a:p>
           <a:p>
             <a:pPr marL="0" marR="0" lvl="0" indent="0" algn="l" defTabSz="914400" rtl="0" eaLnBrk="1" fontAlgn="auto" latinLnBrk="0" hangingPunct="1">
@@ -1638,8 +1773,8 @@
               <a:defRPr/>
             </a:pPr>
             <a:r>
-              <a:rPr lang="en-US" altLang="zh-TW" sz="1600" baseline="0" dirty="0" smtClean="0"/>
-              <a:t>point   0.5  0.5 arrow  red</a:t>
+              <a:rPr lang="en-US" altLang="zh-TW" sz="2400" baseline="0" dirty="0" smtClean="0"/>
+              <a:t>Transpose   tex4office_obj23119   replace “””x^2+2x+1”””   “””(x+1)^2”””</a:t>
             </a:r>
           </a:p>
           <a:p>
@@ -1660,9 +1795,118 @@
               <a:tabLst/>
               <a:defRPr/>
             </a:pPr>
-            <a:r>
-              <a:rPr lang="en-US" altLang="zh-TW" sz="1600" baseline="0" dirty="0" smtClean="0"/>
-              <a:t>point   0.5  0.5  arrow  red 50 50</a:t>
+            <a:endParaRPr lang="en-US" altLang="zh-TW" sz="2400" dirty="0" smtClean="0"/>
+          </a:p>
+          <a:p>
+            <a:r>
+              <a:rPr lang="en-US" altLang="zh-TW" sz="2400" dirty="0" smtClean="0"/>
+              <a:t>//Point</a:t>
+            </a:r>
+            <a:r>
+              <a:rPr lang="zh-TW" altLang="en-US" sz="2400" dirty="0" smtClean="0"/>
+              <a:t>指令：產生雷射筆效果</a:t>
+            </a:r>
+            <a:endParaRPr lang="en-US" altLang="zh-TW" sz="2400" dirty="0" smtClean="0"/>
+          </a:p>
+          <a:p>
+            <a:r>
+              <a:rPr lang="en-US" altLang="zh-TW" sz="2400" dirty="0" smtClean="0"/>
+              <a:t>//</a:t>
+            </a:r>
+            <a:r>
+              <a:rPr lang="zh-TW" altLang="en-US" sz="2400" dirty="0" smtClean="0"/>
+              <a:t>用法：</a:t>
+            </a:r>
+            <a:endParaRPr lang="en-US" altLang="zh-TW" sz="2400" dirty="0" smtClean="0"/>
+          </a:p>
+          <a:p>
+            <a:r>
+              <a:rPr lang="en-US" altLang="zh-TW" sz="2400" dirty="0" smtClean="0"/>
+              <a:t>//</a:t>
+            </a:r>
+            <a:r>
+              <a:rPr lang="en-US" altLang="zh-TW" sz="2400" baseline="0" dirty="0" smtClean="0"/>
+              <a:t>         Point </a:t>
+            </a:r>
+            <a:r>
+              <a:rPr lang="en-US" altLang="zh-TW" sz="2400" b="1" i="1" baseline="0" dirty="0" smtClean="0"/>
+              <a:t>&lt;</a:t>
+            </a:r>
+            <a:r>
+              <a:rPr lang="en-US" altLang="zh-TW" sz="2400" b="1" i="1" u="sng" baseline="0" dirty="0" smtClean="0"/>
+              <a:t>X position</a:t>
+            </a:r>
+            <a:r>
+              <a:rPr lang="en-US" altLang="zh-TW" sz="2400" b="1" i="1" baseline="0" dirty="0" smtClean="0"/>
+              <a:t>&gt; &lt;</a:t>
+            </a:r>
+            <a:r>
+              <a:rPr lang="en-US" altLang="zh-TW" sz="2400" b="1" i="1" u="sng" baseline="0" dirty="0" smtClean="0"/>
+              <a:t>Y position</a:t>
+            </a:r>
+            <a:r>
+              <a:rPr lang="en-US" altLang="zh-TW" sz="2400" b="1" i="1" baseline="0" dirty="0" smtClean="0"/>
+              <a:t>&gt; &lt;</a:t>
+            </a:r>
+            <a:r>
+              <a:rPr lang="en-US" altLang="zh-TW" sz="2400" b="1" i="1" u="sng" baseline="0" dirty="0" smtClean="0"/>
+              <a:t>Type</a:t>
+            </a:r>
+            <a:r>
+              <a:rPr lang="en-US" altLang="zh-TW" sz="2400" b="1" i="1" baseline="0" dirty="0" smtClean="0"/>
+              <a:t>&gt; &lt;</a:t>
+            </a:r>
+            <a:r>
+              <a:rPr lang="en-US" altLang="zh-TW" sz="2400" b="1" i="1" u="sng" baseline="0" dirty="0" smtClean="0"/>
+              <a:t>Color</a:t>
+            </a:r>
+            <a:r>
+              <a:rPr lang="en-US" altLang="zh-TW" sz="2400" b="1" i="1" baseline="0" dirty="0" smtClean="0"/>
+              <a:t>&gt; [&lt;</a:t>
+            </a:r>
+            <a:r>
+              <a:rPr lang="en-US" altLang="zh-TW" sz="2400" b="1" i="1" u="sng" baseline="0" dirty="0" smtClean="0"/>
+              <a:t>Width</a:t>
+            </a:r>
+            <a:r>
+              <a:rPr lang="en-US" altLang="zh-TW" sz="2400" b="1" i="1" baseline="0" dirty="0" smtClean="0"/>
+              <a:t>&gt; &lt;</a:t>
+            </a:r>
+            <a:r>
+              <a:rPr lang="en-US" altLang="zh-TW" sz="2400" b="1" i="1" u="sng" baseline="0" dirty="0" smtClean="0"/>
+              <a:t>Height</a:t>
+            </a:r>
+            <a:r>
+              <a:rPr lang="en-US" altLang="zh-TW" sz="2400" b="1" i="1" baseline="0" dirty="0" smtClean="0"/>
+              <a:t>&gt;]</a:t>
+            </a:r>
+            <a:endParaRPr lang="en-US" altLang="zh-TW" sz="2400" b="1" i="1" dirty="0" smtClean="0"/>
+          </a:p>
+          <a:p>
+            <a:r>
+              <a:rPr lang="en-US" altLang="zh-TW" sz="2400" baseline="0" dirty="0" smtClean="0"/>
+              <a:t>point   0.5  0.5  circle  </a:t>
+            </a:r>
+            <a:r>
+              <a:rPr lang="en-US" altLang="zh-TW" sz="2400" b="0" kern="1200" dirty="0" smtClean="0">
+                <a:solidFill>
+                  <a:schemeClr val="tx1"/>
+                </a:solidFill>
+                <a:effectLst/>
+                <a:latin typeface="+mn-lt"/>
+                <a:ea typeface="+mn-ea"/>
+                <a:cs typeface="+mn-cs"/>
+              </a:rPr>
+              <a:t>cyan</a:t>
+            </a:r>
+          </a:p>
+          <a:p>
+            <a:endParaRPr lang="en-US" altLang="zh-TW" sz="2400" dirty="0" smtClean="0"/>
+          </a:p>
+          <a:p>
+            <a:r>
+              <a:rPr lang="en-US" altLang="zh-TW" sz="2400" dirty="0" smtClean="0"/>
+              <a:t>&lt;/script&gt;</a:t>
             </a:r>
           </a:p>
           <a:p>
@@ -1683,7 +1927,23 @@
               <a:tabLst/>
               <a:defRPr/>
             </a:pPr>
-            <a:endParaRPr lang="en-US" altLang="zh-TW" sz="1600" baseline="0" dirty="0" smtClean="0"/>
+            <a:r>
+              <a:rPr lang="en-US" altLang="zh-TW" sz="2400" dirty="0" smtClean="0"/>
+              <a:t>//</a:t>
+            </a:r>
+            <a:r>
+              <a:rPr lang="zh-TW" altLang="en-US" sz="2400" dirty="0" smtClean="0"/>
+              <a:t>結束</a:t>
+            </a:r>
+            <a:r>
+              <a:rPr lang="en-US" altLang="zh-TW" sz="2400" dirty="0" smtClean="0"/>
+              <a:t>Perfect Lecture</a:t>
+            </a:r>
+            <a:r>
+              <a:rPr lang="zh-TW" altLang="en-US" sz="2400" dirty="0" smtClean="0"/>
+              <a:t>程式碼</a:t>
+            </a:r>
+            <a:endParaRPr lang="en-US" altLang="zh-TW" sz="2400" dirty="0" smtClean="0"/>
           </a:p>
           <a:p>
             <a:pPr marL="0" marR="0" lvl="0" indent="0" algn="l" defTabSz="914400" rtl="0" eaLnBrk="1" fontAlgn="auto" latinLnBrk="0" hangingPunct="1">
@@ -1703,10 +1963,7 @@
               <a:tabLst/>
               <a:defRPr/>
             </a:pPr>
-            <a:r>
-              <a:rPr lang="en-US" altLang="zh-TW" sz="1600" baseline="0" dirty="0" smtClean="0"/>
-              <a:t>//point   tex4office_obj23119   10%  10%  circle  red</a:t>
-            </a:r>
+            <a:endParaRPr lang="en-US" altLang="zh-TW" sz="2400" dirty="0" smtClean="0"/>
           </a:p>
           <a:p>
             <a:pPr marL="0" marR="0" lvl="0" indent="0" algn="l" defTabSz="914400" rtl="0" eaLnBrk="1" fontAlgn="auto" latinLnBrk="0" hangingPunct="1">
@@ -1726,131 +1983,19 @@
               <a:tabLst/>
               <a:defRPr/>
             </a:pPr>
-            <a:endParaRPr lang="en-US" altLang="zh-TW" sz="1600" baseline="0" dirty="0" smtClean="0"/>
-          </a:p>
-          <a:p>
-            <a:pPr marL="0" marR="0" lvl="0" indent="0" algn="l" defTabSz="914400" rtl="0" eaLnBrk="1" fontAlgn="auto" latinLnBrk="0" hangingPunct="1">
-              <a:lnSpc>
-                <a:spcPct val="100000"/>
-              </a:lnSpc>
-              <a:spcBef>
-                <a:spcPts val="0"/>
-              </a:spcBef>
-              <a:spcAft>
-                <a:spcPts val="0"/>
-              </a:spcAft>
-              <a:buClrTx/>
-              <a:buSzTx/>
-              <a:buFontTx/>
-              <a:buNone/>
-              <a:tabLst/>
-              <a:defRPr/>
-            </a:pPr>
-            <a:r>
-              <a:rPr lang="en-US" altLang="zh-TW" sz="1600" baseline="0" dirty="0" smtClean="0"/>
-              <a:t>*/</a:t>
-            </a:r>
-            <a:endParaRPr lang="en-US" altLang="zh-TW" sz="1600" dirty="0" smtClean="0"/>
-          </a:p>
-          <a:p>
-            <a:endParaRPr lang="en-US" altLang="zh-TW" sz="1600" dirty="0" smtClean="0"/>
-          </a:p>
-          <a:p>
-            <a:endParaRPr lang="en-US" altLang="zh-TW" sz="1600" dirty="0" smtClean="0"/>
-          </a:p>
-          <a:p>
-            <a:r>
-              <a:rPr lang="en-US" altLang="zh-TW" sz="1600" dirty="0" smtClean="0"/>
-              <a:t>&lt;/script&gt;</a:t>
-            </a:r>
-          </a:p>
-          <a:p>
-            <a:pPr marL="0" marR="0" lvl="0" indent="0" algn="l" defTabSz="914400" rtl="0" eaLnBrk="1" fontAlgn="auto" latinLnBrk="0" hangingPunct="1">
-              <a:lnSpc>
-                <a:spcPct val="100000"/>
-              </a:lnSpc>
-              <a:spcBef>
-                <a:spcPts val="0"/>
-              </a:spcBef>
-              <a:spcAft>
-                <a:spcPts val="0"/>
-              </a:spcAft>
-              <a:buClrTx/>
-              <a:buSzTx/>
-              <a:buFontTx/>
-              <a:buNone/>
-              <a:tabLst/>
-              <a:defRPr/>
-            </a:pPr>
-            <a:r>
-              <a:rPr lang="en-US" altLang="zh-TW" sz="1600" dirty="0" smtClean="0"/>
+            <a:r>
+              <a:rPr lang="en-US" altLang="zh-TW" sz="2400" dirty="0" smtClean="0"/>
               <a:t>//</a:t>
             </a:r>
             <a:r>
-              <a:rPr lang="zh-TW" altLang="en-US" sz="1600" dirty="0" smtClean="0"/>
-              <a:t>結束</a:t>
-            </a:r>
-            <a:r>
-              <a:rPr lang="en-US" altLang="zh-TW" sz="1600" dirty="0" smtClean="0"/>
-              <a:t>Precision Lecture</a:t>
-            </a:r>
-            <a:r>
-              <a:rPr lang="zh-TW" altLang="en-US" sz="1600" dirty="0" smtClean="0"/>
-              <a:t>程式碼</a:t>
-            </a:r>
-            <a:endParaRPr lang="en-US" altLang="zh-TW" sz="1600" dirty="0" smtClean="0"/>
-          </a:p>
-          <a:p>
-            <a:pPr marL="0" marR="0" lvl="0" indent="0" algn="l" defTabSz="914400" rtl="0" eaLnBrk="1" fontAlgn="auto" latinLnBrk="0" hangingPunct="1">
-              <a:lnSpc>
-                <a:spcPct val="100000"/>
-              </a:lnSpc>
-              <a:spcBef>
-                <a:spcPts val="0"/>
-              </a:spcBef>
-              <a:spcAft>
-                <a:spcPts val="0"/>
-              </a:spcAft>
-              <a:buClrTx/>
-              <a:buSzTx/>
-              <a:buFontTx/>
-              <a:buNone/>
-              <a:tabLst/>
-              <a:defRPr/>
-            </a:pPr>
-            <a:endParaRPr lang="en-US" altLang="zh-TW" sz="1600" dirty="0" smtClean="0"/>
-          </a:p>
-          <a:p>
-            <a:pPr marL="0" marR="0" lvl="0" indent="0" algn="l" defTabSz="914400" rtl="0" eaLnBrk="1" fontAlgn="auto" latinLnBrk="0" hangingPunct="1">
-              <a:lnSpc>
-                <a:spcPct val="100000"/>
-              </a:lnSpc>
-              <a:spcBef>
-                <a:spcPts val="0"/>
-              </a:spcBef>
-              <a:spcAft>
-                <a:spcPts val="0"/>
-              </a:spcAft>
-              <a:buClrTx/>
-              <a:buSzTx/>
-              <a:buFontTx/>
-              <a:buNone/>
-              <a:tabLst/>
-              <a:defRPr/>
-            </a:pPr>
-            <a:r>
-              <a:rPr lang="en-US" altLang="zh-TW" sz="1600" dirty="0" smtClean="0"/>
-              <a:t>//</a:t>
-            </a:r>
-            <a:r>
-              <a:rPr lang="zh-TW" altLang="en-US" sz="1600" dirty="0" smtClean="0"/>
+              <a:rPr lang="zh-TW" altLang="en-US" sz="2400" dirty="0" smtClean="0"/>
               <a:t>後面備註隨便要打什麼都可以</a:t>
             </a:r>
             <a:r>
-              <a:rPr lang="en-US" altLang="zh-TW" sz="1600" dirty="0" smtClean="0"/>
+              <a:rPr lang="en-US" altLang="zh-TW" sz="2400" smtClean="0"/>
               <a:t>…</a:t>
             </a:r>
-            <a:endParaRPr lang="zh-TW" altLang="en-US" sz="1600" dirty="0"/>
+            <a:endParaRPr lang="zh-TW" altLang="en-US" sz="2400" dirty="0"/>
           </a:p>
         </p:txBody>
       </p:sp>
@@ -2274,7 +2419,7 @@
           <a:p>
             <a:fld id="{89FC1679-64C7-47E4-9945-DF88529001F1}" type="datetimeFigureOut">
               <a:rPr lang="zh-TW" altLang="en-US" smtClean="0"/>
-              <a:t>2017/7/14</a:t>
+              <a:t>2017/7/19</a:t>
             </a:fld>
             <a:endParaRPr lang="zh-TW" altLang="en-US"/>
           </a:p>
@@ -2444,7 +2589,7 @@
           <a:p>
             <a:fld id="{89FC1679-64C7-47E4-9945-DF88529001F1}" type="datetimeFigureOut">
               <a:rPr lang="zh-TW" altLang="en-US" smtClean="0"/>
-              <a:t>2017/7/14</a:t>
+              <a:t>2017/7/19</a:t>
             </a:fld>
             <a:endParaRPr lang="zh-TW" altLang="en-US"/>
           </a:p>
@@ -2624,7 +2769,7 @@
           <a:p>
             <a:fld id="{89FC1679-64C7-47E4-9945-DF88529001F1}" type="datetimeFigureOut">
               <a:rPr lang="zh-TW" altLang="en-US" smtClean="0"/>
-              <a:t>2017/7/14</a:t>
+              <a:t>2017/7/19</a:t>
             </a:fld>
             <a:endParaRPr lang="zh-TW" altLang="en-US"/>
           </a:p>
@@ -2794,7 +2939,7 @@
           <a:p>
             <a:fld id="{89FC1679-64C7-47E4-9945-DF88529001F1}" type="datetimeFigureOut">
               <a:rPr lang="zh-TW" altLang="en-US" smtClean="0"/>
-              <a:t>2017/7/14</a:t>
+              <a:t>2017/7/19</a:t>
             </a:fld>
             <a:endParaRPr lang="zh-TW" altLang="en-US"/>
           </a:p>
@@ -3040,7 +3185,7 @@
           <a:p>
             <a:fld id="{89FC1679-64C7-47E4-9945-DF88529001F1}" type="datetimeFigureOut">
               <a:rPr lang="zh-TW" altLang="en-US" smtClean="0"/>
-              <a:t>2017/7/14</a:t>
+              <a:t>2017/7/19</a:t>
             </a:fld>
             <a:endParaRPr lang="zh-TW" altLang="en-US"/>
           </a:p>
@@ -3272,7 +3417,7 @@
           <a:p>
             <a:fld id="{89FC1679-64C7-47E4-9945-DF88529001F1}" type="datetimeFigureOut">
               <a:rPr lang="zh-TW" altLang="en-US" smtClean="0"/>
-              <a:t>2017/7/14</a:t>
+              <a:t>2017/7/19</a:t>
             </a:fld>
             <a:endParaRPr lang="zh-TW" altLang="en-US"/>
           </a:p>
@@ -3639,7 +3784,7 @@
           <a:p>
             <a:fld id="{89FC1679-64C7-47E4-9945-DF88529001F1}" type="datetimeFigureOut">
               <a:rPr lang="zh-TW" altLang="en-US" smtClean="0"/>
-              <a:t>2017/7/14</a:t>
+              <a:t>2017/7/19</a:t>
             </a:fld>
             <a:endParaRPr lang="zh-TW" altLang="en-US"/>
           </a:p>
@@ -3757,7 +3902,7 @@
           <a:p>
             <a:fld id="{89FC1679-64C7-47E4-9945-DF88529001F1}" type="datetimeFigureOut">
               <a:rPr lang="zh-TW" altLang="en-US" smtClean="0"/>
-              <a:t>2017/7/14</a:t>
+              <a:t>2017/7/19</a:t>
             </a:fld>
             <a:endParaRPr lang="zh-TW" altLang="en-US"/>
           </a:p>
@@ -3852,7 +3997,7 @@
           <a:p>
             <a:fld id="{89FC1679-64C7-47E4-9945-DF88529001F1}" type="datetimeFigureOut">
               <a:rPr lang="zh-TW" altLang="en-US" smtClean="0"/>
-              <a:t>2017/7/14</a:t>
+              <a:t>2017/7/19</a:t>
             </a:fld>
             <a:endParaRPr lang="zh-TW" altLang="en-US"/>
           </a:p>
@@ -4129,7 +4274,7 @@
           <a:p>
             <a:fld id="{89FC1679-64C7-47E4-9945-DF88529001F1}" type="datetimeFigureOut">
               <a:rPr lang="zh-TW" altLang="en-US" smtClean="0"/>
-              <a:t>2017/7/14</a:t>
+              <a:t>2017/7/19</a:t>
             </a:fld>
             <a:endParaRPr lang="zh-TW" altLang="en-US"/>
           </a:p>
@@ -4386,7 +4531,7 @@
           <a:p>
             <a:fld id="{89FC1679-64C7-47E4-9945-DF88529001F1}" type="datetimeFigureOut">
               <a:rPr lang="zh-TW" altLang="en-US" smtClean="0"/>
-              <a:t>2017/7/14</a:t>
+              <a:t>2017/7/19</a:t>
             </a:fld>
             <a:endParaRPr lang="zh-TW" altLang="en-US"/>
           </a:p>
@@ -4599,7 +4744,7 @@
           <a:p>
             <a:fld id="{89FC1679-64C7-47E4-9945-DF88529001F1}" type="datetimeFigureOut">
               <a:rPr lang="zh-TW" altLang="en-US" smtClean="0"/>
-              <a:t>2017/7/14</a:t>
+              <a:t>2017/7/19</a:t>
             </a:fld>
             <a:endParaRPr lang="zh-TW" altLang="en-US"/>
           </a:p>

</xml_diff>

<commit_message>
Add demos and syntax overview for sublabel
</commit_message>
<xml_diff>
--- a/Demo/Syntax Overview16：9.pptx
+++ b/Demo/Syntax Overview16：9.pptx
@@ -198,7 +198,7 @@
           <a:p>
             <a:fld id="{0CE264FF-0559-40C9-B7C9-136E68807C0A}" type="datetimeFigureOut">
               <a:rPr lang="zh-TW" altLang="en-US" smtClean="0"/>
-              <a:t>2017/7/19</a:t>
+              <a:t>2017/8/20</a:t>
             </a:fld>
             <a:endParaRPr lang="zh-TW" altLang="en-US"/>
           </a:p>
@@ -1795,6 +1795,200 @@
               <a:tabLst/>
               <a:defRPr/>
             </a:pPr>
+            <a:endParaRPr lang="en-US" altLang="zh-TW" sz="2400" baseline="0" dirty="0" smtClean="0"/>
+          </a:p>
+          <a:p>
+            <a:pPr marL="0" marR="0" lvl="0" indent="0" algn="l" defTabSz="914400" rtl="0" eaLnBrk="1" fontAlgn="auto" latinLnBrk="0" hangingPunct="1">
+              <a:lnSpc>
+                <a:spcPct val="100000"/>
+              </a:lnSpc>
+              <a:spcBef>
+                <a:spcPts val="0"/>
+              </a:spcBef>
+              <a:spcAft>
+                <a:spcPts val="0"/>
+              </a:spcAft>
+              <a:buClrTx/>
+              <a:buSzTx/>
+              <a:buFontTx/>
+              <a:buNone/>
+              <a:tabLst/>
+              <a:defRPr/>
+            </a:pPr>
+            <a:r>
+              <a:rPr lang="en-US" altLang="zh-TW" sz="2400" dirty="0" smtClean="0"/>
+              <a:t>//</a:t>
+            </a:r>
+            <a:r>
+              <a:rPr lang="en-US" altLang="zh-TW" sz="2400" baseline="0" dirty="0" smtClean="0"/>
+              <a:t>         2. Replace</a:t>
+            </a:r>
+            <a:r>
+              <a:rPr lang="zh-TW" altLang="en-US" sz="2400" baseline="0" dirty="0" smtClean="0"/>
+              <a:t>功能：  </a:t>
+            </a:r>
+            <a:r>
+              <a:rPr lang="en-US" altLang="zh-TW" sz="2400" baseline="0" dirty="0" smtClean="0"/>
+              <a:t>Transpose </a:t>
+            </a:r>
+            <a:r>
+              <a:rPr lang="en-US" altLang="zh-TW" sz="2400" b="1" i="1" u="none" baseline="0" dirty="0" smtClean="0"/>
+              <a:t>&lt;</a:t>
+            </a:r>
+            <a:r>
+              <a:rPr lang="en-US" altLang="zh-TW" sz="2400" b="1" i="1" u="sng" baseline="0" dirty="0" smtClean="0"/>
+              <a:t>TeX4Office</a:t>
+            </a:r>
+            <a:r>
+              <a:rPr lang="zh-TW" altLang="en-US" sz="2400" b="1" i="1" u="sng" baseline="0" dirty="0" smtClean="0"/>
+              <a:t>物件名</a:t>
+            </a:r>
+            <a:r>
+              <a:rPr lang="en-US" altLang="zh-TW" sz="2400" b="1" i="1" u="none" baseline="0" dirty="0" smtClean="0"/>
+              <a:t>&gt;</a:t>
+            </a:r>
+            <a:r>
+              <a:rPr lang="en-US" altLang="zh-TW" sz="2400" b="1" i="1" u="sng" baseline="0" dirty="0" smtClean="0"/>
+              <a:t> </a:t>
+            </a:r>
+            <a:r>
+              <a:rPr lang="en-US" altLang="zh-TW" sz="2400" baseline="0" dirty="0" smtClean="0"/>
+              <a:t>replace  </a:t>
+            </a:r>
+            <a:r>
+              <a:rPr lang="en-US" altLang="zh-TW" sz="2400" b="1" i="1" baseline="0" dirty="0" smtClean="0"/>
+              <a:t>\sublabel{ </a:t>
+            </a:r>
+            <a:r>
+              <a:rPr lang="en-US" altLang="zh-TW" sz="2400" b="1" i="1" u="sng" baseline="0" dirty="0" smtClean="0"/>
+              <a:t>&lt;</a:t>
+            </a:r>
+            <a:r>
+              <a:rPr lang="en-US" altLang="zh-TW" sz="2400" b="1" i="1" u="sng" baseline="0" dirty="0" err="1" smtClean="0"/>
+              <a:t>sulabel</a:t>
+            </a:r>
+            <a:r>
+              <a:rPr lang="zh-TW" altLang="en-US" sz="2400" b="1" i="1" u="sng" baseline="0" dirty="0" smtClean="0"/>
+              <a:t>名</a:t>
+            </a:r>
+            <a:r>
+              <a:rPr lang="en-US" altLang="zh-TW" sz="2400" b="1" i="1" u="sng" baseline="0" dirty="0" smtClean="0"/>
+              <a:t>&gt; </a:t>
+            </a:r>
+            <a:r>
+              <a:rPr lang="en-US" altLang="zh-TW" sz="2400" b="1" i="1" baseline="0" dirty="0" smtClean="0"/>
+              <a:t>}</a:t>
+            </a:r>
+            <a:r>
+              <a:rPr lang="en-US" altLang="zh-TW" sz="2400" b="1" i="1" u="none" baseline="0" dirty="0" smtClean="0"/>
+              <a:t> &lt;</a:t>
+            </a:r>
+            <a:r>
+              <a:rPr lang="zh-TW" altLang="en-US" sz="2400" b="1" i="1" u="sng" baseline="0" dirty="0" smtClean="0"/>
+              <a:t>用來取代的新字串</a:t>
+            </a:r>
+            <a:r>
+              <a:rPr lang="en-US" altLang="zh-TW" sz="2400" b="1" i="1" u="none" baseline="0" dirty="0" smtClean="0"/>
+              <a:t>&gt;</a:t>
+            </a:r>
+            <a:endParaRPr lang="en-US" altLang="zh-TW" sz="2400" baseline="0" dirty="0" smtClean="0"/>
+          </a:p>
+          <a:p>
+            <a:pPr marL="0" marR="0" lvl="0" indent="0" algn="l" defTabSz="914400" rtl="0" eaLnBrk="1" fontAlgn="auto" latinLnBrk="0" hangingPunct="1">
+              <a:lnSpc>
+                <a:spcPct val="100000"/>
+              </a:lnSpc>
+              <a:spcBef>
+                <a:spcPts val="0"/>
+              </a:spcBef>
+              <a:spcAft>
+                <a:spcPts val="0"/>
+              </a:spcAft>
+              <a:buClrTx/>
+              <a:buSzTx/>
+              <a:buFontTx/>
+              <a:buNone/>
+              <a:tabLst/>
+              <a:defRPr/>
+            </a:pPr>
+            <a:endParaRPr lang="en-US" altLang="zh-TW" sz="2400" baseline="0" dirty="0" smtClean="0"/>
+          </a:p>
+          <a:p>
+            <a:pPr marL="0" marR="0" lvl="0" indent="0" algn="l" defTabSz="914400" rtl="0" eaLnBrk="1" fontAlgn="auto" latinLnBrk="0" hangingPunct="1">
+              <a:lnSpc>
+                <a:spcPct val="100000"/>
+              </a:lnSpc>
+              <a:spcBef>
+                <a:spcPts val="0"/>
+              </a:spcBef>
+              <a:spcAft>
+                <a:spcPts val="0"/>
+              </a:spcAft>
+              <a:buClrTx/>
+              <a:buSzTx/>
+              <a:buFontTx/>
+              <a:buNone/>
+              <a:tabLst/>
+              <a:defRPr/>
+            </a:pPr>
+            <a:r>
+              <a:rPr lang="en-US" altLang="zh-TW" sz="2400" baseline="0" dirty="0" smtClean="0"/>
+              <a:t>Transpose   tex4office_obj17479   replace “””\sublabel{</a:t>
+            </a:r>
+            <a:r>
+              <a:rPr lang="en-US" altLang="zh-TW" sz="1100" kern="1200" dirty="0" err="1" smtClean="0">
+                <a:solidFill>
+                  <a:schemeClr val="tx1"/>
+                </a:solidFill>
+                <a:latin typeface="+mn-lt"/>
+                <a:ea typeface="+mn-ea"/>
+                <a:cs typeface="+mn-cs"/>
+              </a:rPr>
+              <a:t>to_be_factored</a:t>
+            </a:r>
+            <a:r>
+              <a:rPr lang="en-US" altLang="zh-TW" sz="2400" baseline="0" dirty="0" smtClean="0"/>
+              <a:t>}”””   “””(x+1)(x-2)”””</a:t>
+            </a:r>
+          </a:p>
+          <a:p>
+            <a:pPr marL="0" marR="0" lvl="0" indent="0" algn="l" defTabSz="914400" rtl="0" eaLnBrk="1" fontAlgn="auto" latinLnBrk="0" hangingPunct="1">
+              <a:lnSpc>
+                <a:spcPct val="100000"/>
+              </a:lnSpc>
+              <a:spcBef>
+                <a:spcPts val="0"/>
+              </a:spcBef>
+              <a:spcAft>
+                <a:spcPts val="0"/>
+              </a:spcAft>
+              <a:buClrTx/>
+              <a:buSzTx/>
+              <a:buFontTx/>
+              <a:buNone/>
+              <a:tabLst/>
+              <a:defRPr/>
+            </a:pPr>
+            <a:endParaRPr lang="en-US" altLang="zh-TW" sz="2400" baseline="0" dirty="0" smtClean="0"/>
+          </a:p>
+          <a:p>
+            <a:pPr marL="0" marR="0" lvl="0" indent="0" algn="l" defTabSz="914400" rtl="0" eaLnBrk="1" fontAlgn="auto" latinLnBrk="0" hangingPunct="1">
+              <a:lnSpc>
+                <a:spcPct val="100000"/>
+              </a:lnSpc>
+              <a:spcBef>
+                <a:spcPts val="0"/>
+              </a:spcBef>
+              <a:spcAft>
+                <a:spcPts val="0"/>
+              </a:spcAft>
+              <a:buClrTx/>
+              <a:buSzTx/>
+              <a:buFontTx/>
+              <a:buNone/>
+              <a:tabLst/>
+              <a:defRPr/>
+            </a:pPr>
             <a:endParaRPr lang="en-US" altLang="zh-TW" sz="2400" dirty="0" smtClean="0"/>
           </a:p>
           <a:p>
@@ -2419,7 +2613,7 @@
           <a:p>
             <a:fld id="{89FC1679-64C7-47E4-9945-DF88529001F1}" type="datetimeFigureOut">
               <a:rPr lang="zh-TW" altLang="en-US" smtClean="0"/>
-              <a:t>2017/7/19</a:t>
+              <a:t>2017/8/20</a:t>
             </a:fld>
             <a:endParaRPr lang="zh-TW" altLang="en-US"/>
           </a:p>
@@ -2589,7 +2783,7 @@
           <a:p>
             <a:fld id="{89FC1679-64C7-47E4-9945-DF88529001F1}" type="datetimeFigureOut">
               <a:rPr lang="zh-TW" altLang="en-US" smtClean="0"/>
-              <a:t>2017/7/19</a:t>
+              <a:t>2017/8/20</a:t>
             </a:fld>
             <a:endParaRPr lang="zh-TW" altLang="en-US"/>
           </a:p>
@@ -2769,7 +2963,7 @@
           <a:p>
             <a:fld id="{89FC1679-64C7-47E4-9945-DF88529001F1}" type="datetimeFigureOut">
               <a:rPr lang="zh-TW" altLang="en-US" smtClean="0"/>
-              <a:t>2017/7/19</a:t>
+              <a:t>2017/8/20</a:t>
             </a:fld>
             <a:endParaRPr lang="zh-TW" altLang="en-US"/>
           </a:p>
@@ -2939,7 +3133,7 @@
           <a:p>
             <a:fld id="{89FC1679-64C7-47E4-9945-DF88529001F1}" type="datetimeFigureOut">
               <a:rPr lang="zh-TW" altLang="en-US" smtClean="0"/>
-              <a:t>2017/7/19</a:t>
+              <a:t>2017/8/20</a:t>
             </a:fld>
             <a:endParaRPr lang="zh-TW" altLang="en-US"/>
           </a:p>
@@ -3185,7 +3379,7 @@
           <a:p>
             <a:fld id="{89FC1679-64C7-47E4-9945-DF88529001F1}" type="datetimeFigureOut">
               <a:rPr lang="zh-TW" altLang="en-US" smtClean="0"/>
-              <a:t>2017/7/19</a:t>
+              <a:t>2017/8/20</a:t>
             </a:fld>
             <a:endParaRPr lang="zh-TW" altLang="en-US"/>
           </a:p>
@@ -3417,7 +3611,7 @@
           <a:p>
             <a:fld id="{89FC1679-64C7-47E4-9945-DF88529001F1}" type="datetimeFigureOut">
               <a:rPr lang="zh-TW" altLang="en-US" smtClean="0"/>
-              <a:t>2017/7/19</a:t>
+              <a:t>2017/8/20</a:t>
             </a:fld>
             <a:endParaRPr lang="zh-TW" altLang="en-US"/>
           </a:p>
@@ -3784,7 +3978,7 @@
           <a:p>
             <a:fld id="{89FC1679-64C7-47E4-9945-DF88529001F1}" type="datetimeFigureOut">
               <a:rPr lang="zh-TW" altLang="en-US" smtClean="0"/>
-              <a:t>2017/7/19</a:t>
+              <a:t>2017/8/20</a:t>
             </a:fld>
             <a:endParaRPr lang="zh-TW" altLang="en-US"/>
           </a:p>
@@ -3902,7 +4096,7 @@
           <a:p>
             <a:fld id="{89FC1679-64C7-47E4-9945-DF88529001F1}" type="datetimeFigureOut">
               <a:rPr lang="zh-TW" altLang="en-US" smtClean="0"/>
-              <a:t>2017/7/19</a:t>
+              <a:t>2017/8/20</a:t>
             </a:fld>
             <a:endParaRPr lang="zh-TW" altLang="en-US"/>
           </a:p>
@@ -3997,7 +4191,7 @@
           <a:p>
             <a:fld id="{89FC1679-64C7-47E4-9945-DF88529001F1}" type="datetimeFigureOut">
               <a:rPr lang="zh-TW" altLang="en-US" smtClean="0"/>
-              <a:t>2017/7/19</a:t>
+              <a:t>2017/8/20</a:t>
             </a:fld>
             <a:endParaRPr lang="zh-TW" altLang="en-US"/>
           </a:p>
@@ -4274,7 +4468,7 @@
           <a:p>
             <a:fld id="{89FC1679-64C7-47E4-9945-DF88529001F1}" type="datetimeFigureOut">
               <a:rPr lang="zh-TW" altLang="en-US" smtClean="0"/>
-              <a:t>2017/7/19</a:t>
+              <a:t>2017/8/20</a:t>
             </a:fld>
             <a:endParaRPr lang="zh-TW" altLang="en-US"/>
           </a:p>
@@ -4531,7 +4725,7 @@
           <a:p>
             <a:fld id="{89FC1679-64C7-47E4-9945-DF88529001F1}" type="datetimeFigureOut">
               <a:rPr lang="zh-TW" altLang="en-US" smtClean="0"/>
-              <a:t>2017/7/19</a:t>
+              <a:t>2017/8/20</a:t>
             </a:fld>
             <a:endParaRPr lang="zh-TW" altLang="en-US"/>
           </a:p>
@@ -4744,7 +4938,7 @@
           <a:p>
             <a:fld id="{89FC1679-64C7-47E4-9945-DF88529001F1}" type="datetimeFigureOut">
               <a:rPr lang="zh-TW" altLang="en-US" smtClean="0"/>
-              <a:t>2017/7/19</a:t>
+              <a:t>2017/8/20</a:t>
             </a:fld>
             <a:endParaRPr lang="zh-TW" altLang="en-US"/>
           </a:p>
@@ -5217,6 +5411,36 @@
           <a:xfrm>
             <a:off x="3497263" y="2168525"/>
             <a:ext cx="4338660" cy="660400"/>
+          </a:xfrm>
+          <a:prstGeom prst="rect">
+            <a:avLst/>
+          </a:prstGeom>
+        </p:spPr>
+      </p:pic>
+      <p:pic>
+        <p:nvPicPr>
+          <p:cNvPr id="4" name="tex4office_obj17479" descr="\documentclass{article}&#10;\usepackage{amsmath}&#10;\usepackage{CJKutf8}      %%% Macros for Chinese/Japanese/Korean processing&#10;\usepackage{CJKnumb}      %%% For Chinese numbering capability&#10;&#10;\pagestyle{empty}&#10;&#10;\newcommand{\sublabel}[2]{#2} %%% Implement \sublabel command&#10;&#10;\begin{document}&#10;\begin{CJK}{UTF8}{bsmi}   %%% Change CJK font and encoding here!&#10;&#10;&#10;$y =\sublabel{to_be_factored}{ x^2+x-2}$ %%% With the &quot;amsmath&quot; package, now you can include CJK charaters in subscription and superscriptiion (in the &quot;\text&quot; tag)&#10;&#10;\end{CJK}&#10;\end{document}"/>
+          <p:cNvPicPr>
+            <a:picLocks noChangeAspect="1"/>
+          </p:cNvPicPr>
+          <p:nvPr/>
+        </p:nvPicPr>
+        <p:blipFill>
+          <a:blip r:embed="rId4">
+            <a:extLst>
+              <a:ext uri="{28A0092B-C50C-407E-A947-70E740481C1C}">
+                <a14:useLocalDpi xmlns:a14="http://schemas.microsoft.com/office/drawing/2010/main" val="0"/>
+              </a:ext>
+            </a:extLst>
+          </a:blip>
+          <a:stretch>
+            <a:fillRect/>
+          </a:stretch>
+        </p:blipFill>
+        <p:spPr>
+          <a:xfrm>
+            <a:off x="3497263" y="3171825"/>
+            <a:ext cx="4029395" cy="658800"/>
           </a:xfrm>
           <a:prstGeom prst="rect">
             <a:avLst/>

</xml_diff>